<commit_message>
Update slide - animation
</commit_message>
<xml_diff>
--- a/Docs/Rushup.pptx
+++ b/Docs/Rushup.pptx
@@ -15,8 +15,7 @@
     <p:sldId id="267" r:id="rId9"/>
     <p:sldId id="268" r:id="rId10"/>
     <p:sldId id="262" r:id="rId11"/>
-    <p:sldId id="260" r:id="rId12"/>
-    <p:sldId id="261" r:id="rId13"/>
+    <p:sldId id="261" r:id="rId12"/>
   </p:sldIdLst>
   <p:sldSz cx="12192000" cy="6858000"/>
   <p:notesSz cx="6858000" cy="9144000"/>
@@ -1911,7 +1910,13 @@
     </dgm:pt>
     <dgm:pt modelId="{C693805A-7184-4E30-BE4B-4EF11638EEEF}">
       <dgm:prSet phldrT="[Texte]"/>
-      <dgm:spPr/>
+      <dgm:spPr>
+        <a:solidFill>
+          <a:schemeClr val="accent4">
+            <a:lumMod val="75000"/>
+          </a:schemeClr>
+        </a:solidFill>
+      </dgm:spPr>
       <dgm:t>
         <a:bodyPr/>
         <a:lstStyle/>
@@ -1948,7 +1953,13 @@
     </dgm:pt>
     <dgm:pt modelId="{3421A122-9284-4756-80E7-C2F4EEB3C994}">
       <dgm:prSet phldrT="[Texte]"/>
-      <dgm:spPr/>
+      <dgm:spPr>
+        <a:solidFill>
+          <a:schemeClr val="accent4">
+            <a:lumMod val="75000"/>
+          </a:schemeClr>
+        </a:solidFill>
+      </dgm:spPr>
       <dgm:t>
         <a:bodyPr/>
         <a:lstStyle/>
@@ -1985,7 +1996,13 @@
     </dgm:pt>
     <dgm:pt modelId="{59FB6444-2263-4A64-8427-A6BB8B0EBEBC}">
       <dgm:prSet phldrT="[Texte]"/>
-      <dgm:spPr/>
+      <dgm:spPr>
+        <a:solidFill>
+          <a:schemeClr val="accent4">
+            <a:lumMod val="75000"/>
+          </a:schemeClr>
+        </a:solidFill>
+      </dgm:spPr>
       <dgm:t>
         <a:bodyPr/>
         <a:lstStyle/>
@@ -2022,7 +2039,13 @@
     </dgm:pt>
     <dgm:pt modelId="{7AF7A540-419C-4A9F-8D2A-083F012AF965}">
       <dgm:prSet/>
-      <dgm:spPr/>
+      <dgm:spPr>
+        <a:solidFill>
+          <a:schemeClr val="accent4">
+            <a:lumMod val="75000"/>
+          </a:schemeClr>
+        </a:solidFill>
+      </dgm:spPr>
       <dgm:t>
         <a:bodyPr/>
         <a:lstStyle/>
@@ -2059,7 +2082,13 @@
     </dgm:pt>
     <dgm:pt modelId="{EF52BCC4-F9DC-4ECC-BDCC-AEB51555BECB}">
       <dgm:prSet/>
-      <dgm:spPr/>
+      <dgm:spPr>
+        <a:solidFill>
+          <a:schemeClr val="accent4">
+            <a:lumMod val="75000"/>
+          </a:schemeClr>
+        </a:solidFill>
+      </dgm:spPr>
       <dgm:t>
         <a:bodyPr/>
         <a:lstStyle/>
@@ -2096,7 +2125,13 @@
     </dgm:pt>
     <dgm:pt modelId="{68768EEC-8423-4011-99D9-4D6F3EDC3809}">
       <dgm:prSet/>
-      <dgm:spPr/>
+      <dgm:spPr>
+        <a:solidFill>
+          <a:schemeClr val="accent2">
+            <a:lumMod val="75000"/>
+          </a:schemeClr>
+        </a:solidFill>
+      </dgm:spPr>
       <dgm:t>
         <a:bodyPr/>
         <a:lstStyle/>
@@ -2170,7 +2205,13 @@
     </dgm:pt>
     <dgm:pt modelId="{4D3CB479-614D-48CB-ADA6-6FF5362F0D67}">
       <dgm:prSet/>
-      <dgm:spPr/>
+      <dgm:spPr>
+        <a:solidFill>
+          <a:schemeClr val="accent2">
+            <a:lumMod val="75000"/>
+          </a:schemeClr>
+        </a:solidFill>
+      </dgm:spPr>
       <dgm:t>
         <a:bodyPr/>
         <a:lstStyle/>
@@ -2211,7 +2252,13 @@
     </dgm:pt>
     <dgm:pt modelId="{573614D4-8D5D-4224-8843-2A282A3CE896}">
       <dgm:prSet/>
-      <dgm:spPr/>
+      <dgm:spPr>
+        <a:solidFill>
+          <a:schemeClr val="accent4">
+            <a:lumMod val="75000"/>
+          </a:schemeClr>
+        </a:solidFill>
+      </dgm:spPr>
       <dgm:t>
         <a:bodyPr/>
         <a:lstStyle/>
@@ -2894,11 +2941,8 @@
           <a:avLst/>
         </a:prstGeom>
         <a:solidFill>
-          <a:schemeClr val="accent1">
-            <a:hueOff val="0"/>
-            <a:satOff val="0"/>
-            <a:lumOff val="0"/>
-            <a:alphaOff val="0"/>
+          <a:schemeClr val="accent4">
+            <a:lumMod val="75000"/>
           </a:schemeClr>
         </a:solidFill>
         <a:ln w="15875" cap="flat" cmpd="sng" algn="ctr">
@@ -2971,11 +3015,8 @@
           <a:avLst/>
         </a:prstGeom>
         <a:solidFill>
-          <a:schemeClr val="accent1">
-            <a:hueOff val="0"/>
-            <a:satOff val="0"/>
-            <a:lumOff val="0"/>
-            <a:alphaOff val="0"/>
+          <a:schemeClr val="accent4">
+            <a:lumMod val="75000"/>
           </a:schemeClr>
         </a:solidFill>
         <a:ln w="15875" cap="flat" cmpd="sng" algn="ctr">
@@ -3048,11 +3089,8 @@
           <a:avLst/>
         </a:prstGeom>
         <a:solidFill>
-          <a:schemeClr val="accent1">
-            <a:hueOff val="0"/>
-            <a:satOff val="0"/>
-            <a:lumOff val="0"/>
-            <a:alphaOff val="0"/>
+          <a:schemeClr val="accent4">
+            <a:lumMod val="75000"/>
           </a:schemeClr>
         </a:solidFill>
         <a:ln w="15875" cap="flat" cmpd="sng" algn="ctr">
@@ -3125,11 +3163,8 @@
           <a:avLst/>
         </a:prstGeom>
         <a:solidFill>
-          <a:schemeClr val="accent1">
-            <a:hueOff val="0"/>
-            <a:satOff val="0"/>
-            <a:lumOff val="0"/>
-            <a:alphaOff val="0"/>
+          <a:schemeClr val="accent4">
+            <a:lumMod val="75000"/>
           </a:schemeClr>
         </a:solidFill>
         <a:ln w="15875" cap="flat" cmpd="sng" algn="ctr">
@@ -3202,11 +3237,8 @@
           <a:avLst/>
         </a:prstGeom>
         <a:solidFill>
-          <a:schemeClr val="accent1">
-            <a:hueOff val="0"/>
-            <a:satOff val="0"/>
-            <a:lumOff val="0"/>
-            <a:alphaOff val="0"/>
+          <a:schemeClr val="accent4">
+            <a:lumMod val="75000"/>
           </a:schemeClr>
         </a:solidFill>
         <a:ln w="15875" cap="flat" cmpd="sng" algn="ctr">
@@ -3279,11 +3311,8 @@
           <a:avLst/>
         </a:prstGeom>
         <a:solidFill>
-          <a:schemeClr val="accent1">
-            <a:hueOff val="0"/>
-            <a:satOff val="0"/>
-            <a:lumOff val="0"/>
-            <a:alphaOff val="0"/>
+          <a:schemeClr val="accent4">
+            <a:lumMod val="75000"/>
           </a:schemeClr>
         </a:solidFill>
         <a:ln w="15875" cap="flat" cmpd="sng" algn="ctr">
@@ -3356,11 +3385,8 @@
           <a:avLst/>
         </a:prstGeom>
         <a:solidFill>
-          <a:schemeClr val="accent1">
-            <a:hueOff val="0"/>
-            <a:satOff val="0"/>
-            <a:lumOff val="0"/>
-            <a:alphaOff val="0"/>
+          <a:schemeClr val="accent2">
+            <a:lumMod val="75000"/>
           </a:schemeClr>
         </a:solidFill>
         <a:ln w="15875" cap="flat" cmpd="sng" algn="ctr">
@@ -3510,11 +3536,8 @@
           <a:avLst/>
         </a:prstGeom>
         <a:solidFill>
-          <a:schemeClr val="accent1">
-            <a:hueOff val="0"/>
-            <a:satOff val="0"/>
-            <a:lumOff val="0"/>
-            <a:alphaOff val="0"/>
+          <a:schemeClr val="accent2">
+            <a:lumMod val="75000"/>
           </a:schemeClr>
         </a:solidFill>
         <a:ln w="15875" cap="flat" cmpd="sng" algn="ctr">
@@ -19474,6 +19497,142 @@
   <p:clrMapOvr>
     <a:masterClrMapping/>
   </p:clrMapOvr>
+  <p:timing>
+    <p:tnLst>
+      <p:par>
+        <p:cTn id="1" dur="indefinite" restart="never" nodeType="tmRoot">
+          <p:childTnLst>
+            <p:seq concurrent="1" nextAc="seek">
+              <p:cTn id="2" dur="indefinite" nodeType="mainSeq">
+                <p:childTnLst>
+                  <p:par>
+                    <p:cTn id="3" fill="hold">
+                      <p:stCondLst>
+                        <p:cond delay="indefinite"/>
+                      </p:stCondLst>
+                      <p:childTnLst>
+                        <p:par>
+                          <p:cTn id="4" fill="hold">
+                            <p:stCondLst>
+                              <p:cond delay="0"/>
+                            </p:stCondLst>
+                            <p:childTnLst>
+                              <p:par>
+                                <p:cTn id="5" presetID="10" presetClass="entr" presetSubtype="0" fill="hold" nodeType="clickEffect">
+                                  <p:stCondLst>
+                                    <p:cond delay="0"/>
+                                  </p:stCondLst>
+                                  <p:childTnLst>
+                                    <p:set>
+                                      <p:cBhvr>
+                                        <p:cTn id="6" dur="1" fill="hold">
+                                          <p:stCondLst>
+                                            <p:cond delay="0"/>
+                                          </p:stCondLst>
+                                        </p:cTn>
+                                        <p:tgtEl>
+                                          <p:spTgt spid="5"/>
+                                        </p:tgtEl>
+                                        <p:attrNameLst>
+                                          <p:attrName>style.visibility</p:attrName>
+                                        </p:attrNameLst>
+                                      </p:cBhvr>
+                                      <p:to>
+                                        <p:strVal val="visible"/>
+                                      </p:to>
+                                    </p:set>
+                                    <p:animEffect transition="in" filter="fade">
+                                      <p:cBhvr>
+                                        <p:cTn id="7" dur="500"/>
+                                        <p:tgtEl>
+                                          <p:spTgt spid="5"/>
+                                        </p:tgtEl>
+                                      </p:cBhvr>
+                                    </p:animEffect>
+                                  </p:childTnLst>
+                                </p:cTn>
+                              </p:par>
+                            </p:childTnLst>
+                          </p:cTn>
+                        </p:par>
+                      </p:childTnLst>
+                    </p:cTn>
+                  </p:par>
+                  <p:par>
+                    <p:cTn id="8" fill="hold">
+                      <p:stCondLst>
+                        <p:cond delay="indefinite"/>
+                      </p:stCondLst>
+                      <p:childTnLst>
+                        <p:par>
+                          <p:cTn id="9" fill="hold">
+                            <p:stCondLst>
+                              <p:cond delay="0"/>
+                            </p:stCondLst>
+                            <p:childTnLst>
+                              <p:par>
+                                <p:cTn id="10" presetID="10" presetClass="entr" presetSubtype="0" fill="hold" nodeType="clickEffect">
+                                  <p:stCondLst>
+                                    <p:cond delay="0"/>
+                                  </p:stCondLst>
+                                  <p:childTnLst>
+                                    <p:set>
+                                      <p:cBhvr>
+                                        <p:cTn id="11" dur="1" fill="hold">
+                                          <p:stCondLst>
+                                            <p:cond delay="0"/>
+                                          </p:stCondLst>
+                                        </p:cTn>
+                                        <p:tgtEl>
+                                          <p:spTgt spid="4"/>
+                                        </p:tgtEl>
+                                        <p:attrNameLst>
+                                          <p:attrName>style.visibility</p:attrName>
+                                        </p:attrNameLst>
+                                      </p:cBhvr>
+                                      <p:to>
+                                        <p:strVal val="visible"/>
+                                      </p:to>
+                                    </p:set>
+                                    <p:animEffect transition="in" filter="fade">
+                                      <p:cBhvr>
+                                        <p:cTn id="12" dur="500"/>
+                                        <p:tgtEl>
+                                          <p:spTgt spid="4"/>
+                                        </p:tgtEl>
+                                      </p:cBhvr>
+                                    </p:animEffect>
+                                  </p:childTnLst>
+                                </p:cTn>
+                              </p:par>
+                            </p:childTnLst>
+                          </p:cTn>
+                        </p:par>
+                      </p:childTnLst>
+                    </p:cTn>
+                  </p:par>
+                </p:childTnLst>
+              </p:cTn>
+              <p:prevCondLst>
+                <p:cond evt="onPrev" delay="0">
+                  <p:tgtEl>
+                    <p:sldTgt/>
+                  </p:tgtEl>
+                </p:cond>
+              </p:prevCondLst>
+              <p:nextCondLst>
+                <p:cond evt="onNext" delay="0">
+                  <p:tgtEl>
+                    <p:sldTgt/>
+                  </p:tgtEl>
+                </p:cond>
+              </p:nextCondLst>
+            </p:seq>
+          </p:childTnLst>
+        </p:cTn>
+      </p:par>
+    </p:tnLst>
+  </p:timing>
 </p:sld>
 </file>
 
@@ -19496,12 +19655,12 @@
       </p:grpSpPr>
       <p:sp>
         <p:nvSpPr>
-          <p:cNvPr id="2" name="Titre 1"/>
+          <p:cNvPr id="4" name="Titre 3"/>
           <p:cNvSpPr>
             <a:spLocks noGrp="1"/>
           </p:cNvSpPr>
           <p:nvPr>
-            <p:ph type="title"/>
+            <p:ph type="ctrTitle"/>
           </p:nvPr>
         </p:nvSpPr>
         <p:spPr/>
@@ -19509,86 +19668,23 @@
           <a:bodyPr/>
           <a:lstStyle/>
           <a:p>
+            <a:pPr algn="ctr"/>
+            <a:r>
+              <a:rPr lang="fr-FR" dirty="0" smtClean="0"/>
+              <a:t>Merci – Questions?</a:t>
+            </a:r>
             <a:endParaRPr lang="fr-FR" dirty="0"/>
           </a:p>
         </p:txBody>
       </p:sp>
       <p:sp>
         <p:nvSpPr>
-          <p:cNvPr id="3" name="Espace réservé du contenu 2"/>
+          <p:cNvPr id="5" name="Sous-titre 4"/>
           <p:cNvSpPr>
             <a:spLocks noGrp="1"/>
           </p:cNvSpPr>
           <p:nvPr>
-            <p:ph idx="1"/>
-          </p:nvPr>
-        </p:nvSpPr>
-        <p:spPr/>
-        <p:txBody>
-          <a:bodyPr/>
-          <a:lstStyle/>
-          <a:p>
-            <a:endParaRPr lang="fr-FR"/>
-          </a:p>
-        </p:txBody>
-      </p:sp>
-    </p:spTree>
-    <p:extLst>
-      <p:ext uri="{BB962C8B-B14F-4D97-AF65-F5344CB8AC3E}">
-        <p14:creationId xmlns:p14="http://schemas.microsoft.com/office/powerpoint/2010/main" val="3073564625"/>
-      </p:ext>
-    </p:extLst>
-  </p:cSld>
-  <p:clrMapOvr>
-    <a:masterClrMapping/>
-  </p:clrMapOvr>
-</p:sld>
-</file>
-
-<file path=ppt/slides/slide12.xml><?xml version="1.0" encoding="utf-8"?>
-<p:sld xmlns:a="http://schemas.openxmlformats.org/drawingml/2006/main" xmlns:r="http://schemas.openxmlformats.org/officeDocument/2006/relationships" xmlns:p="http://schemas.openxmlformats.org/presentationml/2006/main">
-  <p:cSld>
-    <p:spTree>
-      <p:nvGrpSpPr>
-        <p:cNvPr id="1" name=""/>
-        <p:cNvGrpSpPr/>
-        <p:nvPr/>
-      </p:nvGrpSpPr>
-      <p:grpSpPr>
-        <a:xfrm>
-          <a:off x="0" y="0"/>
-          <a:ext cx="0" cy="0"/>
-          <a:chOff x="0" y="0"/>
-          <a:chExt cx="0" cy="0"/>
-        </a:xfrm>
-      </p:grpSpPr>
-      <p:sp>
-        <p:nvSpPr>
-          <p:cNvPr id="2" name="Titre 1"/>
-          <p:cNvSpPr>
-            <a:spLocks noGrp="1"/>
-          </p:cNvSpPr>
-          <p:nvPr>
-            <p:ph type="title"/>
-          </p:nvPr>
-        </p:nvSpPr>
-        <p:spPr/>
-        <p:txBody>
-          <a:bodyPr/>
-          <a:lstStyle/>
-          <a:p>
-            <a:endParaRPr lang="fr-FR"/>
-          </a:p>
-        </p:txBody>
-      </p:sp>
-      <p:sp>
-        <p:nvSpPr>
-          <p:cNvPr id="3" name="Espace réservé du contenu 2"/>
-          <p:cNvSpPr>
-            <a:spLocks noGrp="1"/>
-          </p:cNvSpPr>
-          <p:nvPr>
-            <p:ph idx="1"/>
+            <p:ph type="subTitle" idx="1"/>
           </p:nvPr>
         </p:nvSpPr>
         <p:spPr/>
@@ -19610,6 +19706,13 @@
   <p:clrMapOvr>
     <a:masterClrMapping/>
   </p:clrMapOvr>
+  <p:timing>
+    <p:tnLst>
+      <p:par>
+        <p:cTn id="1" dur="indefinite" restart="never" nodeType="tmRoot"/>
+      </p:par>
+    </p:tnLst>
+  </p:timing>
 </p:sld>
 </file>
 
@@ -19756,6 +19859,309 @@
   <p:clrMapOvr>
     <a:masterClrMapping/>
   </p:clrMapOvr>
+  <p:timing>
+    <p:tnLst>
+      <p:par>
+        <p:cTn id="1" dur="indefinite" restart="never" nodeType="tmRoot">
+          <p:childTnLst>
+            <p:seq concurrent="1" nextAc="seek">
+              <p:cTn id="2" dur="indefinite" nodeType="mainSeq">
+                <p:childTnLst>
+                  <p:par>
+                    <p:cTn id="3" fill="hold">
+                      <p:stCondLst>
+                        <p:cond delay="indefinite"/>
+                      </p:stCondLst>
+                      <p:childTnLst>
+                        <p:par>
+                          <p:cTn id="4" fill="hold">
+                            <p:stCondLst>
+                              <p:cond delay="0"/>
+                            </p:stCondLst>
+                            <p:childTnLst>
+                              <p:par>
+                                <p:cTn id="5" presetID="2" presetClass="entr" presetSubtype="8" fill="hold" nodeType="clickEffect">
+                                  <p:stCondLst>
+                                    <p:cond delay="0"/>
+                                  </p:stCondLst>
+                                  <p:childTnLst>
+                                    <p:set>
+                                      <p:cBhvr>
+                                        <p:cTn id="6" dur="1" fill="hold">
+                                          <p:stCondLst>
+                                            <p:cond delay="0"/>
+                                          </p:stCondLst>
+                                        </p:cTn>
+                                        <p:tgtEl>
+                                          <p:spTgt spid="8"/>
+                                        </p:tgtEl>
+                                        <p:attrNameLst>
+                                          <p:attrName>style.visibility</p:attrName>
+                                        </p:attrNameLst>
+                                      </p:cBhvr>
+                                      <p:to>
+                                        <p:strVal val="visible"/>
+                                      </p:to>
+                                    </p:set>
+                                    <p:anim calcmode="lin" valueType="num">
+                                      <p:cBhvr additive="base">
+                                        <p:cTn id="7" dur="500" fill="hold"/>
+                                        <p:tgtEl>
+                                          <p:spTgt spid="8"/>
+                                        </p:tgtEl>
+                                        <p:attrNameLst>
+                                          <p:attrName>ppt_x</p:attrName>
+                                        </p:attrNameLst>
+                                      </p:cBhvr>
+                                      <p:tavLst>
+                                        <p:tav tm="0">
+                                          <p:val>
+                                            <p:strVal val="0-#ppt_w/2"/>
+                                          </p:val>
+                                        </p:tav>
+                                        <p:tav tm="100000">
+                                          <p:val>
+                                            <p:strVal val="#ppt_x"/>
+                                          </p:val>
+                                        </p:tav>
+                                      </p:tavLst>
+                                    </p:anim>
+                                    <p:anim calcmode="lin" valueType="num">
+                                      <p:cBhvr additive="base">
+                                        <p:cTn id="8" dur="500" fill="hold"/>
+                                        <p:tgtEl>
+                                          <p:spTgt spid="8"/>
+                                        </p:tgtEl>
+                                        <p:attrNameLst>
+                                          <p:attrName>ppt_y</p:attrName>
+                                        </p:attrNameLst>
+                                      </p:cBhvr>
+                                      <p:tavLst>
+                                        <p:tav tm="0">
+                                          <p:val>
+                                            <p:strVal val="#ppt_y"/>
+                                          </p:val>
+                                        </p:tav>
+                                        <p:tav tm="100000">
+                                          <p:val>
+                                            <p:strVal val="#ppt_y"/>
+                                          </p:val>
+                                        </p:tav>
+                                      </p:tavLst>
+                                    </p:anim>
+                                  </p:childTnLst>
+                                </p:cTn>
+                              </p:par>
+                            </p:childTnLst>
+                          </p:cTn>
+                        </p:par>
+                      </p:childTnLst>
+                    </p:cTn>
+                  </p:par>
+                  <p:par>
+                    <p:cTn id="9" fill="hold">
+                      <p:stCondLst>
+                        <p:cond delay="indefinite"/>
+                      </p:stCondLst>
+                      <p:childTnLst>
+                        <p:par>
+                          <p:cTn id="10" fill="hold">
+                            <p:stCondLst>
+                              <p:cond delay="0"/>
+                            </p:stCondLst>
+                            <p:childTnLst>
+                              <p:par>
+                                <p:cTn id="11" presetID="2" presetClass="entr" presetSubtype="8" fill="hold" nodeType="clickEffect">
+                                  <p:stCondLst>
+                                    <p:cond delay="0"/>
+                                  </p:stCondLst>
+                                  <p:childTnLst>
+                                    <p:set>
+                                      <p:cBhvr>
+                                        <p:cTn id="12" dur="1" fill="hold">
+                                          <p:stCondLst>
+                                            <p:cond delay="0"/>
+                                          </p:stCondLst>
+                                        </p:cTn>
+                                        <p:tgtEl>
+                                          <p:spTgt spid="9"/>
+                                        </p:tgtEl>
+                                        <p:attrNameLst>
+                                          <p:attrName>style.visibility</p:attrName>
+                                        </p:attrNameLst>
+                                      </p:cBhvr>
+                                      <p:to>
+                                        <p:strVal val="visible"/>
+                                      </p:to>
+                                    </p:set>
+                                    <p:anim calcmode="lin" valueType="num">
+                                      <p:cBhvr additive="base">
+                                        <p:cTn id="13" dur="500" fill="hold"/>
+                                        <p:tgtEl>
+                                          <p:spTgt spid="9"/>
+                                        </p:tgtEl>
+                                        <p:attrNameLst>
+                                          <p:attrName>ppt_x</p:attrName>
+                                        </p:attrNameLst>
+                                      </p:cBhvr>
+                                      <p:tavLst>
+                                        <p:tav tm="0">
+                                          <p:val>
+                                            <p:strVal val="0-#ppt_w/2"/>
+                                          </p:val>
+                                        </p:tav>
+                                        <p:tav tm="100000">
+                                          <p:val>
+                                            <p:strVal val="#ppt_x"/>
+                                          </p:val>
+                                        </p:tav>
+                                      </p:tavLst>
+                                    </p:anim>
+                                    <p:anim calcmode="lin" valueType="num">
+                                      <p:cBhvr additive="base">
+                                        <p:cTn id="14" dur="500" fill="hold"/>
+                                        <p:tgtEl>
+                                          <p:spTgt spid="9"/>
+                                        </p:tgtEl>
+                                        <p:attrNameLst>
+                                          <p:attrName>ppt_y</p:attrName>
+                                        </p:attrNameLst>
+                                      </p:cBhvr>
+                                      <p:tavLst>
+                                        <p:tav tm="0">
+                                          <p:val>
+                                            <p:strVal val="#ppt_y"/>
+                                          </p:val>
+                                        </p:tav>
+                                        <p:tav tm="100000">
+                                          <p:val>
+                                            <p:strVal val="#ppt_y"/>
+                                          </p:val>
+                                        </p:tav>
+                                      </p:tavLst>
+                                    </p:anim>
+                                  </p:childTnLst>
+                                </p:cTn>
+                              </p:par>
+                            </p:childTnLst>
+                          </p:cTn>
+                        </p:par>
+                      </p:childTnLst>
+                    </p:cTn>
+                  </p:par>
+                  <p:par>
+                    <p:cTn id="15" fill="hold">
+                      <p:stCondLst>
+                        <p:cond delay="indefinite"/>
+                      </p:stCondLst>
+                      <p:childTnLst>
+                        <p:par>
+                          <p:cTn id="16" fill="hold">
+                            <p:stCondLst>
+                              <p:cond delay="0"/>
+                            </p:stCondLst>
+                            <p:childTnLst>
+                              <p:par>
+                                <p:cTn id="17" presetID="2" presetClass="entr" presetSubtype="8" fill="hold" nodeType="clickEffect">
+                                  <p:stCondLst>
+                                    <p:cond delay="0"/>
+                                  </p:stCondLst>
+                                  <p:childTnLst>
+                                    <p:set>
+                                      <p:cBhvr>
+                                        <p:cTn id="18" dur="1" fill="hold">
+                                          <p:stCondLst>
+                                            <p:cond delay="0"/>
+                                          </p:stCondLst>
+                                        </p:cTn>
+                                        <p:tgtEl>
+                                          <p:spTgt spid="12"/>
+                                        </p:tgtEl>
+                                        <p:attrNameLst>
+                                          <p:attrName>style.visibility</p:attrName>
+                                        </p:attrNameLst>
+                                      </p:cBhvr>
+                                      <p:to>
+                                        <p:strVal val="visible"/>
+                                      </p:to>
+                                    </p:set>
+                                    <p:anim calcmode="lin" valueType="num">
+                                      <p:cBhvr additive="base">
+                                        <p:cTn id="19" dur="500" fill="hold"/>
+                                        <p:tgtEl>
+                                          <p:spTgt spid="12"/>
+                                        </p:tgtEl>
+                                        <p:attrNameLst>
+                                          <p:attrName>ppt_x</p:attrName>
+                                        </p:attrNameLst>
+                                      </p:cBhvr>
+                                      <p:tavLst>
+                                        <p:tav tm="0">
+                                          <p:val>
+                                            <p:strVal val="0-#ppt_w/2"/>
+                                          </p:val>
+                                        </p:tav>
+                                        <p:tav tm="100000">
+                                          <p:val>
+                                            <p:strVal val="#ppt_x"/>
+                                          </p:val>
+                                        </p:tav>
+                                      </p:tavLst>
+                                    </p:anim>
+                                    <p:anim calcmode="lin" valueType="num">
+                                      <p:cBhvr additive="base">
+                                        <p:cTn id="20" dur="500" fill="hold"/>
+                                        <p:tgtEl>
+                                          <p:spTgt spid="12"/>
+                                        </p:tgtEl>
+                                        <p:attrNameLst>
+                                          <p:attrName>ppt_y</p:attrName>
+                                        </p:attrNameLst>
+                                      </p:cBhvr>
+                                      <p:tavLst>
+                                        <p:tav tm="0">
+                                          <p:val>
+                                            <p:strVal val="#ppt_y"/>
+                                          </p:val>
+                                        </p:tav>
+                                        <p:tav tm="100000">
+                                          <p:val>
+                                            <p:strVal val="#ppt_y"/>
+                                          </p:val>
+                                        </p:tav>
+                                      </p:tavLst>
+                                    </p:anim>
+                                  </p:childTnLst>
+                                </p:cTn>
+                              </p:par>
+                            </p:childTnLst>
+                          </p:cTn>
+                        </p:par>
+                      </p:childTnLst>
+                    </p:cTn>
+                  </p:par>
+                </p:childTnLst>
+              </p:cTn>
+              <p:prevCondLst>
+                <p:cond evt="onPrev" delay="0">
+                  <p:tgtEl>
+                    <p:sldTgt/>
+                  </p:tgtEl>
+                </p:cond>
+              </p:prevCondLst>
+              <p:nextCondLst>
+                <p:cond evt="onNext" delay="0">
+                  <p:tgtEl>
+                    <p:sldTgt/>
+                  </p:tgtEl>
+                </p:cond>
+              </p:nextCondLst>
+            </p:seq>
+          </p:childTnLst>
+        </p:cTn>
+      </p:par>
+    </p:tnLst>
+  </p:timing>
 </p:sld>
 </file>
 
@@ -19992,6 +20398,630 @@
   <p:clrMapOvr>
     <a:masterClrMapping/>
   </p:clrMapOvr>
+  <p:timing>
+    <p:tnLst>
+      <p:par>
+        <p:cTn id="1" dur="indefinite" restart="never" nodeType="tmRoot">
+          <p:childTnLst>
+            <p:seq concurrent="1" nextAc="seek">
+              <p:cTn id="2" dur="indefinite" nodeType="mainSeq">
+                <p:childTnLst>
+                  <p:par>
+                    <p:cTn id="3" fill="hold">
+                      <p:stCondLst>
+                        <p:cond delay="indefinite"/>
+                      </p:stCondLst>
+                      <p:childTnLst>
+                        <p:par>
+                          <p:cTn id="4" fill="hold">
+                            <p:stCondLst>
+                              <p:cond delay="0"/>
+                            </p:stCondLst>
+                            <p:childTnLst>
+                              <p:par>
+                                <p:cTn id="5" presetID="42" presetClass="entr" presetSubtype="0" fill="hold" nodeType="clickEffect">
+                                  <p:stCondLst>
+                                    <p:cond delay="0"/>
+                                  </p:stCondLst>
+                                  <p:childTnLst>
+                                    <p:set>
+                                      <p:cBhvr>
+                                        <p:cTn id="6" dur="1" fill="hold">
+                                          <p:stCondLst>
+                                            <p:cond delay="0"/>
+                                          </p:stCondLst>
+                                        </p:cTn>
+                                        <p:tgtEl>
+                                          <p:spTgt spid="4"/>
+                                        </p:tgtEl>
+                                        <p:attrNameLst>
+                                          <p:attrName>style.visibility</p:attrName>
+                                        </p:attrNameLst>
+                                      </p:cBhvr>
+                                      <p:to>
+                                        <p:strVal val="visible"/>
+                                      </p:to>
+                                    </p:set>
+                                    <p:animEffect transition="in" filter="fade">
+                                      <p:cBhvr>
+                                        <p:cTn id="7" dur="1000"/>
+                                        <p:tgtEl>
+                                          <p:spTgt spid="4"/>
+                                        </p:tgtEl>
+                                      </p:cBhvr>
+                                    </p:animEffect>
+                                    <p:anim calcmode="lin" valueType="num">
+                                      <p:cBhvr>
+                                        <p:cTn id="8" dur="1000" fill="hold"/>
+                                        <p:tgtEl>
+                                          <p:spTgt spid="4"/>
+                                        </p:tgtEl>
+                                        <p:attrNameLst>
+                                          <p:attrName>ppt_x</p:attrName>
+                                        </p:attrNameLst>
+                                      </p:cBhvr>
+                                      <p:tavLst>
+                                        <p:tav tm="0">
+                                          <p:val>
+                                            <p:strVal val="#ppt_x"/>
+                                          </p:val>
+                                        </p:tav>
+                                        <p:tav tm="100000">
+                                          <p:val>
+                                            <p:strVal val="#ppt_x"/>
+                                          </p:val>
+                                        </p:tav>
+                                      </p:tavLst>
+                                    </p:anim>
+                                    <p:anim calcmode="lin" valueType="num">
+                                      <p:cBhvr>
+                                        <p:cTn id="9" dur="1000" fill="hold"/>
+                                        <p:tgtEl>
+                                          <p:spTgt spid="4"/>
+                                        </p:tgtEl>
+                                        <p:attrNameLst>
+                                          <p:attrName>ppt_y</p:attrName>
+                                        </p:attrNameLst>
+                                      </p:cBhvr>
+                                      <p:tavLst>
+                                        <p:tav tm="0">
+                                          <p:val>
+                                            <p:strVal val="#ppt_y+.1"/>
+                                          </p:val>
+                                        </p:tav>
+                                        <p:tav tm="100000">
+                                          <p:val>
+                                            <p:strVal val="#ppt_y"/>
+                                          </p:val>
+                                        </p:tav>
+                                      </p:tavLst>
+                                    </p:anim>
+                                  </p:childTnLst>
+                                </p:cTn>
+                              </p:par>
+                            </p:childTnLst>
+                          </p:cTn>
+                        </p:par>
+                      </p:childTnLst>
+                    </p:cTn>
+                  </p:par>
+                  <p:par>
+                    <p:cTn id="10" fill="hold">
+                      <p:stCondLst>
+                        <p:cond delay="indefinite"/>
+                      </p:stCondLst>
+                      <p:childTnLst>
+                        <p:par>
+                          <p:cTn id="11" fill="hold">
+                            <p:stCondLst>
+                              <p:cond delay="0"/>
+                            </p:stCondLst>
+                            <p:childTnLst>
+                              <p:par>
+                                <p:cTn id="12" presetID="47" presetClass="entr" presetSubtype="0" fill="hold" nodeType="clickEffect">
+                                  <p:stCondLst>
+                                    <p:cond delay="0"/>
+                                  </p:stCondLst>
+                                  <p:childTnLst>
+                                    <p:set>
+                                      <p:cBhvr>
+                                        <p:cTn id="13" dur="1" fill="hold">
+                                          <p:stCondLst>
+                                            <p:cond delay="0"/>
+                                          </p:stCondLst>
+                                        </p:cTn>
+                                        <p:tgtEl>
+                                          <p:spTgt spid="5"/>
+                                        </p:tgtEl>
+                                        <p:attrNameLst>
+                                          <p:attrName>style.visibility</p:attrName>
+                                        </p:attrNameLst>
+                                      </p:cBhvr>
+                                      <p:to>
+                                        <p:strVal val="visible"/>
+                                      </p:to>
+                                    </p:set>
+                                    <p:animEffect transition="in" filter="fade">
+                                      <p:cBhvr>
+                                        <p:cTn id="14" dur="1000"/>
+                                        <p:tgtEl>
+                                          <p:spTgt spid="5"/>
+                                        </p:tgtEl>
+                                      </p:cBhvr>
+                                    </p:animEffect>
+                                    <p:anim calcmode="lin" valueType="num">
+                                      <p:cBhvr>
+                                        <p:cTn id="15" dur="1000" fill="hold"/>
+                                        <p:tgtEl>
+                                          <p:spTgt spid="5"/>
+                                        </p:tgtEl>
+                                        <p:attrNameLst>
+                                          <p:attrName>ppt_x</p:attrName>
+                                        </p:attrNameLst>
+                                      </p:cBhvr>
+                                      <p:tavLst>
+                                        <p:tav tm="0">
+                                          <p:val>
+                                            <p:strVal val="#ppt_x"/>
+                                          </p:val>
+                                        </p:tav>
+                                        <p:tav tm="100000">
+                                          <p:val>
+                                            <p:strVal val="#ppt_x"/>
+                                          </p:val>
+                                        </p:tav>
+                                      </p:tavLst>
+                                    </p:anim>
+                                    <p:anim calcmode="lin" valueType="num">
+                                      <p:cBhvr>
+                                        <p:cTn id="16" dur="1000" fill="hold"/>
+                                        <p:tgtEl>
+                                          <p:spTgt spid="5"/>
+                                        </p:tgtEl>
+                                        <p:attrNameLst>
+                                          <p:attrName>ppt_y</p:attrName>
+                                        </p:attrNameLst>
+                                      </p:cBhvr>
+                                      <p:tavLst>
+                                        <p:tav tm="0">
+                                          <p:val>
+                                            <p:strVal val="#ppt_y-.1"/>
+                                          </p:val>
+                                        </p:tav>
+                                        <p:tav tm="100000">
+                                          <p:val>
+                                            <p:strVal val="#ppt_y"/>
+                                          </p:val>
+                                        </p:tav>
+                                      </p:tavLst>
+                                    </p:anim>
+                                  </p:childTnLst>
+                                </p:cTn>
+                              </p:par>
+                            </p:childTnLst>
+                          </p:cTn>
+                        </p:par>
+                      </p:childTnLst>
+                    </p:cTn>
+                  </p:par>
+                  <p:par>
+                    <p:cTn id="17" fill="hold">
+                      <p:stCondLst>
+                        <p:cond delay="indefinite"/>
+                      </p:stCondLst>
+                      <p:childTnLst>
+                        <p:par>
+                          <p:cTn id="18" fill="hold">
+                            <p:stCondLst>
+                              <p:cond delay="0"/>
+                            </p:stCondLst>
+                            <p:childTnLst>
+                              <p:par>
+                                <p:cTn id="19" presetID="42" presetClass="entr" presetSubtype="0" fill="hold" nodeType="clickEffect">
+                                  <p:stCondLst>
+                                    <p:cond delay="0"/>
+                                  </p:stCondLst>
+                                  <p:childTnLst>
+                                    <p:set>
+                                      <p:cBhvr>
+                                        <p:cTn id="20" dur="1" fill="hold">
+                                          <p:stCondLst>
+                                            <p:cond delay="0"/>
+                                          </p:stCondLst>
+                                        </p:cTn>
+                                        <p:tgtEl>
+                                          <p:spTgt spid="6"/>
+                                        </p:tgtEl>
+                                        <p:attrNameLst>
+                                          <p:attrName>style.visibility</p:attrName>
+                                        </p:attrNameLst>
+                                      </p:cBhvr>
+                                      <p:to>
+                                        <p:strVal val="visible"/>
+                                      </p:to>
+                                    </p:set>
+                                    <p:animEffect transition="in" filter="fade">
+                                      <p:cBhvr>
+                                        <p:cTn id="21" dur="1000"/>
+                                        <p:tgtEl>
+                                          <p:spTgt spid="6"/>
+                                        </p:tgtEl>
+                                      </p:cBhvr>
+                                    </p:animEffect>
+                                    <p:anim calcmode="lin" valueType="num">
+                                      <p:cBhvr>
+                                        <p:cTn id="22" dur="1000" fill="hold"/>
+                                        <p:tgtEl>
+                                          <p:spTgt spid="6"/>
+                                        </p:tgtEl>
+                                        <p:attrNameLst>
+                                          <p:attrName>ppt_x</p:attrName>
+                                        </p:attrNameLst>
+                                      </p:cBhvr>
+                                      <p:tavLst>
+                                        <p:tav tm="0">
+                                          <p:val>
+                                            <p:strVal val="#ppt_x"/>
+                                          </p:val>
+                                        </p:tav>
+                                        <p:tav tm="100000">
+                                          <p:val>
+                                            <p:strVal val="#ppt_x"/>
+                                          </p:val>
+                                        </p:tav>
+                                      </p:tavLst>
+                                    </p:anim>
+                                    <p:anim calcmode="lin" valueType="num">
+                                      <p:cBhvr>
+                                        <p:cTn id="23" dur="1000" fill="hold"/>
+                                        <p:tgtEl>
+                                          <p:spTgt spid="6"/>
+                                        </p:tgtEl>
+                                        <p:attrNameLst>
+                                          <p:attrName>ppt_y</p:attrName>
+                                        </p:attrNameLst>
+                                      </p:cBhvr>
+                                      <p:tavLst>
+                                        <p:tav tm="0">
+                                          <p:val>
+                                            <p:strVal val="#ppt_y+.1"/>
+                                          </p:val>
+                                        </p:tav>
+                                        <p:tav tm="100000">
+                                          <p:val>
+                                            <p:strVal val="#ppt_y"/>
+                                          </p:val>
+                                        </p:tav>
+                                      </p:tavLst>
+                                    </p:anim>
+                                  </p:childTnLst>
+                                </p:cTn>
+                              </p:par>
+                            </p:childTnLst>
+                          </p:cTn>
+                        </p:par>
+                      </p:childTnLst>
+                    </p:cTn>
+                  </p:par>
+                  <p:par>
+                    <p:cTn id="24" fill="hold">
+                      <p:stCondLst>
+                        <p:cond delay="indefinite"/>
+                      </p:stCondLst>
+                      <p:childTnLst>
+                        <p:par>
+                          <p:cTn id="25" fill="hold">
+                            <p:stCondLst>
+                              <p:cond delay="0"/>
+                            </p:stCondLst>
+                            <p:childTnLst>
+                              <p:par>
+                                <p:cTn id="26" presetID="47" presetClass="entr" presetSubtype="0" fill="hold" nodeType="clickEffect">
+                                  <p:stCondLst>
+                                    <p:cond delay="0"/>
+                                  </p:stCondLst>
+                                  <p:childTnLst>
+                                    <p:set>
+                                      <p:cBhvr>
+                                        <p:cTn id="27" dur="1" fill="hold">
+                                          <p:stCondLst>
+                                            <p:cond delay="0"/>
+                                          </p:stCondLst>
+                                        </p:cTn>
+                                        <p:tgtEl>
+                                          <p:spTgt spid="7"/>
+                                        </p:tgtEl>
+                                        <p:attrNameLst>
+                                          <p:attrName>style.visibility</p:attrName>
+                                        </p:attrNameLst>
+                                      </p:cBhvr>
+                                      <p:to>
+                                        <p:strVal val="visible"/>
+                                      </p:to>
+                                    </p:set>
+                                    <p:animEffect transition="in" filter="fade">
+                                      <p:cBhvr>
+                                        <p:cTn id="28" dur="1000"/>
+                                        <p:tgtEl>
+                                          <p:spTgt spid="7"/>
+                                        </p:tgtEl>
+                                      </p:cBhvr>
+                                    </p:animEffect>
+                                    <p:anim calcmode="lin" valueType="num">
+                                      <p:cBhvr>
+                                        <p:cTn id="29" dur="1000" fill="hold"/>
+                                        <p:tgtEl>
+                                          <p:spTgt spid="7"/>
+                                        </p:tgtEl>
+                                        <p:attrNameLst>
+                                          <p:attrName>ppt_x</p:attrName>
+                                        </p:attrNameLst>
+                                      </p:cBhvr>
+                                      <p:tavLst>
+                                        <p:tav tm="0">
+                                          <p:val>
+                                            <p:strVal val="#ppt_x"/>
+                                          </p:val>
+                                        </p:tav>
+                                        <p:tav tm="100000">
+                                          <p:val>
+                                            <p:strVal val="#ppt_x"/>
+                                          </p:val>
+                                        </p:tav>
+                                      </p:tavLst>
+                                    </p:anim>
+                                    <p:anim calcmode="lin" valueType="num">
+                                      <p:cBhvr>
+                                        <p:cTn id="30" dur="1000" fill="hold"/>
+                                        <p:tgtEl>
+                                          <p:spTgt spid="7"/>
+                                        </p:tgtEl>
+                                        <p:attrNameLst>
+                                          <p:attrName>ppt_y</p:attrName>
+                                        </p:attrNameLst>
+                                      </p:cBhvr>
+                                      <p:tavLst>
+                                        <p:tav tm="0">
+                                          <p:val>
+                                            <p:strVal val="#ppt_y-.1"/>
+                                          </p:val>
+                                        </p:tav>
+                                        <p:tav tm="100000">
+                                          <p:val>
+                                            <p:strVal val="#ppt_y"/>
+                                          </p:val>
+                                        </p:tav>
+                                      </p:tavLst>
+                                    </p:anim>
+                                  </p:childTnLst>
+                                </p:cTn>
+                              </p:par>
+                            </p:childTnLst>
+                          </p:cTn>
+                        </p:par>
+                      </p:childTnLst>
+                    </p:cTn>
+                  </p:par>
+                  <p:par>
+                    <p:cTn id="31" fill="hold">
+                      <p:stCondLst>
+                        <p:cond delay="indefinite"/>
+                      </p:stCondLst>
+                      <p:childTnLst>
+                        <p:par>
+                          <p:cTn id="32" fill="hold">
+                            <p:stCondLst>
+                              <p:cond delay="0"/>
+                            </p:stCondLst>
+                            <p:childTnLst>
+                              <p:par>
+                                <p:cTn id="33" presetID="42" presetClass="entr" presetSubtype="0" fill="hold" nodeType="clickEffect">
+                                  <p:stCondLst>
+                                    <p:cond delay="0"/>
+                                  </p:stCondLst>
+                                  <p:childTnLst>
+                                    <p:set>
+                                      <p:cBhvr>
+                                        <p:cTn id="34" dur="1" fill="hold">
+                                          <p:stCondLst>
+                                            <p:cond delay="0"/>
+                                          </p:stCondLst>
+                                        </p:cTn>
+                                        <p:tgtEl>
+                                          <p:spTgt spid="8"/>
+                                        </p:tgtEl>
+                                        <p:attrNameLst>
+                                          <p:attrName>style.visibility</p:attrName>
+                                        </p:attrNameLst>
+                                      </p:cBhvr>
+                                      <p:to>
+                                        <p:strVal val="visible"/>
+                                      </p:to>
+                                    </p:set>
+                                    <p:animEffect transition="in" filter="fade">
+                                      <p:cBhvr>
+                                        <p:cTn id="35" dur="1000"/>
+                                        <p:tgtEl>
+                                          <p:spTgt spid="8"/>
+                                        </p:tgtEl>
+                                      </p:cBhvr>
+                                    </p:animEffect>
+                                    <p:anim calcmode="lin" valueType="num">
+                                      <p:cBhvr>
+                                        <p:cTn id="36" dur="1000" fill="hold"/>
+                                        <p:tgtEl>
+                                          <p:spTgt spid="8"/>
+                                        </p:tgtEl>
+                                        <p:attrNameLst>
+                                          <p:attrName>ppt_x</p:attrName>
+                                        </p:attrNameLst>
+                                      </p:cBhvr>
+                                      <p:tavLst>
+                                        <p:tav tm="0">
+                                          <p:val>
+                                            <p:strVal val="#ppt_x"/>
+                                          </p:val>
+                                        </p:tav>
+                                        <p:tav tm="100000">
+                                          <p:val>
+                                            <p:strVal val="#ppt_x"/>
+                                          </p:val>
+                                        </p:tav>
+                                      </p:tavLst>
+                                    </p:anim>
+                                    <p:anim calcmode="lin" valueType="num">
+                                      <p:cBhvr>
+                                        <p:cTn id="37" dur="1000" fill="hold"/>
+                                        <p:tgtEl>
+                                          <p:spTgt spid="8"/>
+                                        </p:tgtEl>
+                                        <p:attrNameLst>
+                                          <p:attrName>ppt_y</p:attrName>
+                                        </p:attrNameLst>
+                                      </p:cBhvr>
+                                      <p:tavLst>
+                                        <p:tav tm="0">
+                                          <p:val>
+                                            <p:strVal val="#ppt_y+.1"/>
+                                          </p:val>
+                                        </p:tav>
+                                        <p:tav tm="100000">
+                                          <p:val>
+                                            <p:strVal val="#ppt_y"/>
+                                          </p:val>
+                                        </p:tav>
+                                      </p:tavLst>
+                                    </p:anim>
+                                  </p:childTnLst>
+                                </p:cTn>
+                              </p:par>
+                            </p:childTnLst>
+                          </p:cTn>
+                        </p:par>
+                      </p:childTnLst>
+                    </p:cTn>
+                  </p:par>
+                  <p:par>
+                    <p:cTn id="38" fill="hold">
+                      <p:stCondLst>
+                        <p:cond delay="indefinite"/>
+                      </p:stCondLst>
+                      <p:childTnLst>
+                        <p:par>
+                          <p:cTn id="39" fill="hold">
+                            <p:stCondLst>
+                              <p:cond delay="0"/>
+                            </p:stCondLst>
+                            <p:childTnLst>
+                              <p:par>
+                                <p:cTn id="40" presetID="47" presetClass="entr" presetSubtype="0" fill="hold" nodeType="clickEffect">
+                                  <p:stCondLst>
+                                    <p:cond delay="0"/>
+                                  </p:stCondLst>
+                                  <p:childTnLst>
+                                    <p:set>
+                                      <p:cBhvr>
+                                        <p:cTn id="41" dur="1" fill="hold">
+                                          <p:stCondLst>
+                                            <p:cond delay="0"/>
+                                          </p:stCondLst>
+                                        </p:cTn>
+                                        <p:tgtEl>
+                                          <p:spTgt spid="9"/>
+                                        </p:tgtEl>
+                                        <p:attrNameLst>
+                                          <p:attrName>style.visibility</p:attrName>
+                                        </p:attrNameLst>
+                                      </p:cBhvr>
+                                      <p:to>
+                                        <p:strVal val="visible"/>
+                                      </p:to>
+                                    </p:set>
+                                    <p:animEffect transition="in" filter="fade">
+                                      <p:cBhvr>
+                                        <p:cTn id="42" dur="1000"/>
+                                        <p:tgtEl>
+                                          <p:spTgt spid="9"/>
+                                        </p:tgtEl>
+                                      </p:cBhvr>
+                                    </p:animEffect>
+                                    <p:anim calcmode="lin" valueType="num">
+                                      <p:cBhvr>
+                                        <p:cTn id="43" dur="1000" fill="hold"/>
+                                        <p:tgtEl>
+                                          <p:spTgt spid="9"/>
+                                        </p:tgtEl>
+                                        <p:attrNameLst>
+                                          <p:attrName>ppt_x</p:attrName>
+                                        </p:attrNameLst>
+                                      </p:cBhvr>
+                                      <p:tavLst>
+                                        <p:tav tm="0">
+                                          <p:val>
+                                            <p:strVal val="#ppt_x"/>
+                                          </p:val>
+                                        </p:tav>
+                                        <p:tav tm="100000">
+                                          <p:val>
+                                            <p:strVal val="#ppt_x"/>
+                                          </p:val>
+                                        </p:tav>
+                                      </p:tavLst>
+                                    </p:anim>
+                                    <p:anim calcmode="lin" valueType="num">
+                                      <p:cBhvr>
+                                        <p:cTn id="44" dur="1000" fill="hold"/>
+                                        <p:tgtEl>
+                                          <p:spTgt spid="9"/>
+                                        </p:tgtEl>
+                                        <p:attrNameLst>
+                                          <p:attrName>ppt_y</p:attrName>
+                                        </p:attrNameLst>
+                                      </p:cBhvr>
+                                      <p:tavLst>
+                                        <p:tav tm="0">
+                                          <p:val>
+                                            <p:strVal val="#ppt_y-.1"/>
+                                          </p:val>
+                                        </p:tav>
+                                        <p:tav tm="100000">
+                                          <p:val>
+                                            <p:strVal val="#ppt_y"/>
+                                          </p:val>
+                                        </p:tav>
+                                      </p:tavLst>
+                                    </p:anim>
+                                  </p:childTnLst>
+                                </p:cTn>
+                              </p:par>
+                            </p:childTnLst>
+                          </p:cTn>
+                        </p:par>
+                      </p:childTnLst>
+                    </p:cTn>
+                  </p:par>
+                </p:childTnLst>
+              </p:cTn>
+              <p:prevCondLst>
+                <p:cond evt="onPrev" delay="0">
+                  <p:tgtEl>
+                    <p:sldTgt/>
+                  </p:tgtEl>
+                </p:cond>
+              </p:prevCondLst>
+              <p:nextCondLst>
+                <p:cond evt="onNext" delay="0">
+                  <p:tgtEl>
+                    <p:sldTgt/>
+                  </p:tgtEl>
+                </p:cond>
+              </p:nextCondLst>
+            </p:seq>
+          </p:childTnLst>
+        </p:cTn>
+      </p:par>
+    </p:tnLst>
+  </p:timing>
 </p:sld>
 </file>
 
@@ -20112,6 +21142,218 @@
   <p:clrMapOvr>
     <a:masterClrMapping/>
   </p:clrMapOvr>
+  <p:timing>
+    <p:tnLst>
+      <p:par>
+        <p:cTn id="1" dur="indefinite" restart="never" nodeType="tmRoot">
+          <p:childTnLst>
+            <p:seq concurrent="1" nextAc="seek">
+              <p:cTn id="2" dur="indefinite" nodeType="mainSeq">
+                <p:childTnLst>
+                  <p:par>
+                    <p:cTn id="3" fill="hold">
+                      <p:stCondLst>
+                        <p:cond delay="indefinite"/>
+                      </p:stCondLst>
+                      <p:childTnLst>
+                        <p:par>
+                          <p:cTn id="4" fill="hold">
+                            <p:stCondLst>
+                              <p:cond delay="0"/>
+                            </p:stCondLst>
+                            <p:childTnLst>
+                              <p:par>
+                                <p:cTn id="5" presetID="2" presetClass="entr" presetSubtype="4" fill="hold" nodeType="clickEffect">
+                                  <p:stCondLst>
+                                    <p:cond delay="0"/>
+                                  </p:stCondLst>
+                                  <p:childTnLst>
+                                    <p:set>
+                                      <p:cBhvr>
+                                        <p:cTn id="6" dur="1" fill="hold">
+                                          <p:stCondLst>
+                                            <p:cond delay="0"/>
+                                          </p:stCondLst>
+                                        </p:cTn>
+                                        <p:tgtEl>
+                                          <p:spTgt spid="10"/>
+                                        </p:tgtEl>
+                                        <p:attrNameLst>
+                                          <p:attrName>style.visibility</p:attrName>
+                                        </p:attrNameLst>
+                                      </p:cBhvr>
+                                      <p:to>
+                                        <p:strVal val="visible"/>
+                                      </p:to>
+                                    </p:set>
+                                    <p:anim calcmode="lin" valueType="num">
+                                      <p:cBhvr additive="base">
+                                        <p:cTn id="7" dur="500" fill="hold"/>
+                                        <p:tgtEl>
+                                          <p:spTgt spid="10"/>
+                                        </p:tgtEl>
+                                        <p:attrNameLst>
+                                          <p:attrName>ppt_x</p:attrName>
+                                        </p:attrNameLst>
+                                      </p:cBhvr>
+                                      <p:tavLst>
+                                        <p:tav tm="0">
+                                          <p:val>
+                                            <p:strVal val="#ppt_x"/>
+                                          </p:val>
+                                        </p:tav>
+                                        <p:tav tm="100000">
+                                          <p:val>
+                                            <p:strVal val="#ppt_x"/>
+                                          </p:val>
+                                        </p:tav>
+                                      </p:tavLst>
+                                    </p:anim>
+                                    <p:anim calcmode="lin" valueType="num">
+                                      <p:cBhvr additive="base">
+                                        <p:cTn id="8" dur="500" fill="hold"/>
+                                        <p:tgtEl>
+                                          <p:spTgt spid="10"/>
+                                        </p:tgtEl>
+                                        <p:attrNameLst>
+                                          <p:attrName>ppt_y</p:attrName>
+                                        </p:attrNameLst>
+                                      </p:cBhvr>
+                                      <p:tavLst>
+                                        <p:tav tm="0">
+                                          <p:val>
+                                            <p:strVal val="1+#ppt_h/2"/>
+                                          </p:val>
+                                        </p:tav>
+                                        <p:tav tm="100000">
+                                          <p:val>
+                                            <p:strVal val="#ppt_y"/>
+                                          </p:val>
+                                        </p:tav>
+                                      </p:tavLst>
+                                    </p:anim>
+                                  </p:childTnLst>
+                                </p:cTn>
+                              </p:par>
+                            </p:childTnLst>
+                          </p:cTn>
+                        </p:par>
+                      </p:childTnLst>
+                    </p:cTn>
+                  </p:par>
+                  <p:par>
+                    <p:cTn id="9" fill="hold">
+                      <p:stCondLst>
+                        <p:cond delay="indefinite"/>
+                      </p:stCondLst>
+                      <p:childTnLst>
+                        <p:par>
+                          <p:cTn id="10" fill="hold">
+                            <p:stCondLst>
+                              <p:cond delay="0"/>
+                            </p:stCondLst>
+                            <p:childTnLst>
+                              <p:par>
+                                <p:cTn id="11" presetID="2" presetClass="entr" presetSubtype="2" fill="hold" nodeType="clickEffect">
+                                  <p:stCondLst>
+                                    <p:cond delay="0"/>
+                                  </p:stCondLst>
+                                  <p:childTnLst>
+                                    <p:set>
+                                      <p:cBhvr>
+                                        <p:cTn id="12" dur="1" fill="hold">
+                                          <p:stCondLst>
+                                            <p:cond delay="0"/>
+                                          </p:stCondLst>
+                                        </p:cTn>
+                                        <p:tgtEl>
+                                          <p:spTgt spid="11"/>
+                                        </p:tgtEl>
+                                        <p:attrNameLst>
+                                          <p:attrName>style.visibility</p:attrName>
+                                        </p:attrNameLst>
+                                      </p:cBhvr>
+                                      <p:to>
+                                        <p:strVal val="visible"/>
+                                      </p:to>
+                                    </p:set>
+                                    <p:anim calcmode="lin" valueType="num">
+                                      <p:cBhvr additive="base">
+                                        <p:cTn id="13" dur="500" fill="hold"/>
+                                        <p:tgtEl>
+                                          <p:spTgt spid="11"/>
+                                        </p:tgtEl>
+                                        <p:attrNameLst>
+                                          <p:attrName>ppt_x</p:attrName>
+                                        </p:attrNameLst>
+                                      </p:cBhvr>
+                                      <p:tavLst>
+                                        <p:tav tm="0">
+                                          <p:val>
+                                            <p:strVal val="1+#ppt_w/2"/>
+                                          </p:val>
+                                        </p:tav>
+                                        <p:tav tm="100000">
+                                          <p:val>
+                                            <p:strVal val="#ppt_x"/>
+                                          </p:val>
+                                        </p:tav>
+                                      </p:tavLst>
+                                    </p:anim>
+                                    <p:anim calcmode="lin" valueType="num">
+                                      <p:cBhvr additive="base">
+                                        <p:cTn id="14" dur="500" fill="hold"/>
+                                        <p:tgtEl>
+                                          <p:spTgt spid="11"/>
+                                        </p:tgtEl>
+                                        <p:attrNameLst>
+                                          <p:attrName>ppt_y</p:attrName>
+                                        </p:attrNameLst>
+                                      </p:cBhvr>
+                                      <p:tavLst>
+                                        <p:tav tm="0">
+                                          <p:val>
+                                            <p:strVal val="#ppt_y"/>
+                                          </p:val>
+                                        </p:tav>
+                                        <p:tav tm="100000">
+                                          <p:val>
+                                            <p:strVal val="#ppt_y"/>
+                                          </p:val>
+                                        </p:tav>
+                                      </p:tavLst>
+                                    </p:anim>
+                                  </p:childTnLst>
+                                </p:cTn>
+                              </p:par>
+                            </p:childTnLst>
+                          </p:cTn>
+                        </p:par>
+                      </p:childTnLst>
+                    </p:cTn>
+                  </p:par>
+                </p:childTnLst>
+              </p:cTn>
+              <p:prevCondLst>
+                <p:cond evt="onPrev" delay="0">
+                  <p:tgtEl>
+                    <p:sldTgt/>
+                  </p:tgtEl>
+                </p:cond>
+              </p:prevCondLst>
+              <p:nextCondLst>
+                <p:cond evt="onNext" delay="0">
+                  <p:tgtEl>
+                    <p:sldTgt/>
+                  </p:tgtEl>
+                </p:cond>
+              </p:nextCondLst>
+            </p:seq>
+          </p:childTnLst>
+        </p:cTn>
+      </p:par>
+    </p:tnLst>
+  </p:timing>
 </p:sld>
 </file>
 
@@ -20340,6 +21582,314 @@
   <p:clrMapOvr>
     <a:masterClrMapping/>
   </p:clrMapOvr>
+  <p:timing>
+    <p:tnLst>
+      <p:par>
+        <p:cTn id="1" dur="indefinite" restart="never" nodeType="tmRoot">
+          <p:childTnLst>
+            <p:seq concurrent="1" nextAc="seek">
+              <p:cTn id="2" dur="indefinite" nodeType="mainSeq">
+                <p:childTnLst>
+                  <p:par>
+                    <p:cTn id="3" fill="hold">
+                      <p:stCondLst>
+                        <p:cond delay="indefinite"/>
+                      </p:stCondLst>
+                      <p:childTnLst>
+                        <p:par>
+                          <p:cTn id="4" fill="hold">
+                            <p:stCondLst>
+                              <p:cond delay="0"/>
+                            </p:stCondLst>
+                            <p:childTnLst>
+                              <p:par>
+                                <p:cTn id="5" presetID="2" presetClass="entr" presetSubtype="8" fill="hold" grpId="0" nodeType="clickEffect">
+                                  <p:stCondLst>
+                                    <p:cond delay="0"/>
+                                  </p:stCondLst>
+                                  <p:childTnLst>
+                                    <p:set>
+                                      <p:cBhvr>
+                                        <p:cTn id="6" dur="1" fill="hold">
+                                          <p:stCondLst>
+                                            <p:cond delay="0"/>
+                                          </p:stCondLst>
+                                        </p:cTn>
+                                        <p:tgtEl>
+                                          <p:spTgt spid="8"/>
+                                        </p:tgtEl>
+                                        <p:attrNameLst>
+                                          <p:attrName>style.visibility</p:attrName>
+                                        </p:attrNameLst>
+                                      </p:cBhvr>
+                                      <p:to>
+                                        <p:strVal val="visible"/>
+                                      </p:to>
+                                    </p:set>
+                                    <p:anim calcmode="lin" valueType="num">
+                                      <p:cBhvr additive="base">
+                                        <p:cTn id="7" dur="500" fill="hold"/>
+                                        <p:tgtEl>
+                                          <p:spTgt spid="8"/>
+                                        </p:tgtEl>
+                                        <p:attrNameLst>
+                                          <p:attrName>ppt_x</p:attrName>
+                                        </p:attrNameLst>
+                                      </p:cBhvr>
+                                      <p:tavLst>
+                                        <p:tav tm="0">
+                                          <p:val>
+                                            <p:strVal val="0-#ppt_w/2"/>
+                                          </p:val>
+                                        </p:tav>
+                                        <p:tav tm="100000">
+                                          <p:val>
+                                            <p:strVal val="#ppt_x"/>
+                                          </p:val>
+                                        </p:tav>
+                                      </p:tavLst>
+                                    </p:anim>
+                                    <p:anim calcmode="lin" valueType="num">
+                                      <p:cBhvr additive="base">
+                                        <p:cTn id="8" dur="500" fill="hold"/>
+                                        <p:tgtEl>
+                                          <p:spTgt spid="8"/>
+                                        </p:tgtEl>
+                                        <p:attrNameLst>
+                                          <p:attrName>ppt_y</p:attrName>
+                                        </p:attrNameLst>
+                                      </p:cBhvr>
+                                      <p:tavLst>
+                                        <p:tav tm="0">
+                                          <p:val>
+                                            <p:strVal val="#ppt_y"/>
+                                          </p:val>
+                                        </p:tav>
+                                        <p:tav tm="100000">
+                                          <p:val>
+                                            <p:strVal val="#ppt_y"/>
+                                          </p:val>
+                                        </p:tav>
+                                      </p:tavLst>
+                                    </p:anim>
+                                  </p:childTnLst>
+                                </p:cTn>
+                              </p:par>
+                            </p:childTnLst>
+                          </p:cTn>
+                        </p:par>
+                      </p:childTnLst>
+                    </p:cTn>
+                  </p:par>
+                  <p:par>
+                    <p:cTn id="9" fill="hold">
+                      <p:stCondLst>
+                        <p:cond delay="indefinite"/>
+                      </p:stCondLst>
+                      <p:childTnLst>
+                        <p:par>
+                          <p:cTn id="10" fill="hold">
+                            <p:stCondLst>
+                              <p:cond delay="0"/>
+                            </p:stCondLst>
+                            <p:childTnLst>
+                              <p:par>
+                                <p:cTn id="11" presetID="2" presetClass="entr" presetSubtype="8" fill="hold" grpId="0" nodeType="clickEffect">
+                                  <p:stCondLst>
+                                    <p:cond delay="0"/>
+                                  </p:stCondLst>
+                                  <p:childTnLst>
+                                    <p:set>
+                                      <p:cBhvr>
+                                        <p:cTn id="12" dur="1" fill="hold">
+                                          <p:stCondLst>
+                                            <p:cond delay="0"/>
+                                          </p:stCondLst>
+                                        </p:cTn>
+                                        <p:tgtEl>
+                                          <p:spTgt spid="9"/>
+                                        </p:tgtEl>
+                                        <p:attrNameLst>
+                                          <p:attrName>style.visibility</p:attrName>
+                                        </p:attrNameLst>
+                                      </p:cBhvr>
+                                      <p:to>
+                                        <p:strVal val="visible"/>
+                                      </p:to>
+                                    </p:set>
+                                    <p:anim calcmode="lin" valueType="num">
+                                      <p:cBhvr additive="base">
+                                        <p:cTn id="13" dur="500" fill="hold"/>
+                                        <p:tgtEl>
+                                          <p:spTgt spid="9"/>
+                                        </p:tgtEl>
+                                        <p:attrNameLst>
+                                          <p:attrName>ppt_x</p:attrName>
+                                        </p:attrNameLst>
+                                      </p:cBhvr>
+                                      <p:tavLst>
+                                        <p:tav tm="0">
+                                          <p:val>
+                                            <p:strVal val="0-#ppt_w/2"/>
+                                          </p:val>
+                                        </p:tav>
+                                        <p:tav tm="100000">
+                                          <p:val>
+                                            <p:strVal val="#ppt_x"/>
+                                          </p:val>
+                                        </p:tav>
+                                      </p:tavLst>
+                                    </p:anim>
+                                    <p:anim calcmode="lin" valueType="num">
+                                      <p:cBhvr additive="base">
+                                        <p:cTn id="14" dur="500" fill="hold"/>
+                                        <p:tgtEl>
+                                          <p:spTgt spid="9"/>
+                                        </p:tgtEl>
+                                        <p:attrNameLst>
+                                          <p:attrName>ppt_y</p:attrName>
+                                        </p:attrNameLst>
+                                      </p:cBhvr>
+                                      <p:tavLst>
+                                        <p:tav tm="0">
+                                          <p:val>
+                                            <p:strVal val="#ppt_y"/>
+                                          </p:val>
+                                        </p:tav>
+                                        <p:tav tm="100000">
+                                          <p:val>
+                                            <p:strVal val="#ppt_y"/>
+                                          </p:val>
+                                        </p:tav>
+                                      </p:tavLst>
+                                    </p:anim>
+                                  </p:childTnLst>
+                                </p:cTn>
+                              </p:par>
+                            </p:childTnLst>
+                          </p:cTn>
+                        </p:par>
+                      </p:childTnLst>
+                    </p:cTn>
+                  </p:par>
+                  <p:par>
+                    <p:cTn id="15" fill="hold">
+                      <p:stCondLst>
+                        <p:cond delay="indefinite"/>
+                      </p:stCondLst>
+                      <p:childTnLst>
+                        <p:par>
+                          <p:cTn id="16" fill="hold">
+                            <p:stCondLst>
+                              <p:cond delay="0"/>
+                            </p:stCondLst>
+                            <p:childTnLst>
+                              <p:par>
+                                <p:cTn id="17" presetID="2" presetClass="entr" presetSubtype="8" fill="hold" grpId="0" nodeType="clickEffect">
+                                  <p:stCondLst>
+                                    <p:cond delay="0"/>
+                                  </p:stCondLst>
+                                  <p:childTnLst>
+                                    <p:set>
+                                      <p:cBhvr>
+                                        <p:cTn id="18" dur="1" fill="hold">
+                                          <p:stCondLst>
+                                            <p:cond delay="0"/>
+                                          </p:stCondLst>
+                                        </p:cTn>
+                                        <p:tgtEl>
+                                          <p:spTgt spid="10"/>
+                                        </p:tgtEl>
+                                        <p:attrNameLst>
+                                          <p:attrName>style.visibility</p:attrName>
+                                        </p:attrNameLst>
+                                      </p:cBhvr>
+                                      <p:to>
+                                        <p:strVal val="visible"/>
+                                      </p:to>
+                                    </p:set>
+                                    <p:anim calcmode="lin" valueType="num">
+                                      <p:cBhvr additive="base">
+                                        <p:cTn id="19" dur="500" fill="hold"/>
+                                        <p:tgtEl>
+                                          <p:spTgt spid="10"/>
+                                        </p:tgtEl>
+                                        <p:attrNameLst>
+                                          <p:attrName>ppt_x</p:attrName>
+                                        </p:attrNameLst>
+                                      </p:cBhvr>
+                                      <p:tavLst>
+                                        <p:tav tm="0">
+                                          <p:val>
+                                            <p:strVal val="0-#ppt_w/2"/>
+                                          </p:val>
+                                        </p:tav>
+                                        <p:tav tm="100000">
+                                          <p:val>
+                                            <p:strVal val="#ppt_x"/>
+                                          </p:val>
+                                        </p:tav>
+                                      </p:tavLst>
+                                    </p:anim>
+                                    <p:anim calcmode="lin" valueType="num">
+                                      <p:cBhvr additive="base">
+                                        <p:cTn id="20" dur="500" fill="hold"/>
+                                        <p:tgtEl>
+                                          <p:spTgt spid="10"/>
+                                        </p:tgtEl>
+                                        <p:attrNameLst>
+                                          <p:attrName>ppt_y</p:attrName>
+                                        </p:attrNameLst>
+                                      </p:cBhvr>
+                                      <p:tavLst>
+                                        <p:tav tm="0">
+                                          <p:val>
+                                            <p:strVal val="#ppt_y"/>
+                                          </p:val>
+                                        </p:tav>
+                                        <p:tav tm="100000">
+                                          <p:val>
+                                            <p:strVal val="#ppt_y"/>
+                                          </p:val>
+                                        </p:tav>
+                                      </p:tavLst>
+                                    </p:anim>
+                                  </p:childTnLst>
+                                </p:cTn>
+                              </p:par>
+                            </p:childTnLst>
+                          </p:cTn>
+                        </p:par>
+                      </p:childTnLst>
+                    </p:cTn>
+                  </p:par>
+                </p:childTnLst>
+              </p:cTn>
+              <p:prevCondLst>
+                <p:cond evt="onPrev" delay="0">
+                  <p:tgtEl>
+                    <p:sldTgt/>
+                  </p:tgtEl>
+                </p:cond>
+              </p:prevCondLst>
+              <p:nextCondLst>
+                <p:cond evt="onNext" delay="0">
+                  <p:tgtEl>
+                    <p:sldTgt/>
+                  </p:tgtEl>
+                </p:cond>
+              </p:nextCondLst>
+            </p:seq>
+          </p:childTnLst>
+        </p:cTn>
+      </p:par>
+    </p:tnLst>
+    <p:bldLst>
+      <p:bldP spid="8" grpId="0" animBg="1"/>
+      <p:bldP spid="9" grpId="0" animBg="1"/>
+      <p:bldP spid="10" grpId="0" animBg="1"/>
+    </p:bldLst>
+  </p:timing>
 </p:sld>
 </file>
 
@@ -20429,6 +21979,13 @@
   <p:clrMapOvr>
     <a:masterClrMapping/>
   </p:clrMapOvr>
+  <p:timing>
+    <p:tnLst>
+      <p:par>
+        <p:cTn id="1" dur="indefinite" restart="never" nodeType="tmRoot"/>
+      </p:par>
+    </p:tnLst>
+  </p:timing>
 </p:sld>
 </file>
 
@@ -20533,6 +22090,791 @@
   <p:clrMapOvr>
     <a:masterClrMapping/>
   </p:clrMapOvr>
+  <p:timing>
+    <p:tnLst>
+      <p:par>
+        <p:cTn id="1" dur="indefinite" restart="never" nodeType="tmRoot">
+          <p:childTnLst>
+            <p:seq concurrent="1" nextAc="seek">
+              <p:cTn id="2" dur="indefinite" nodeType="mainSeq">
+                <p:childTnLst>
+                  <p:par>
+                    <p:cTn id="3" fill="hold">
+                      <p:stCondLst>
+                        <p:cond delay="indefinite"/>
+                      </p:stCondLst>
+                      <p:childTnLst>
+                        <p:par>
+                          <p:cTn id="4" fill="hold">
+                            <p:stCondLst>
+                              <p:cond delay="0"/>
+                            </p:stCondLst>
+                            <p:childTnLst>
+                              <p:par>
+                                <p:cTn id="5" presetID="42" presetClass="entr" presetSubtype="0" fill="hold" nodeType="clickEffect">
+                                  <p:stCondLst>
+                                    <p:cond delay="0"/>
+                                  </p:stCondLst>
+                                  <p:childTnLst>
+                                    <p:set>
+                                      <p:cBhvr>
+                                        <p:cTn id="6" dur="1" fill="hold">
+                                          <p:stCondLst>
+                                            <p:cond delay="0"/>
+                                          </p:stCondLst>
+                                        </p:cTn>
+                                        <p:tgtEl>
+                                          <p:spTgt spid="4"/>
+                                        </p:tgtEl>
+                                        <p:attrNameLst>
+                                          <p:attrName>style.visibility</p:attrName>
+                                        </p:attrNameLst>
+                                      </p:cBhvr>
+                                      <p:to>
+                                        <p:strVal val="visible"/>
+                                      </p:to>
+                                    </p:set>
+                                    <p:animEffect transition="in" filter="fade">
+                                      <p:cBhvr>
+                                        <p:cTn id="7" dur="1000"/>
+                                        <p:tgtEl>
+                                          <p:spTgt spid="4"/>
+                                        </p:tgtEl>
+                                      </p:cBhvr>
+                                    </p:animEffect>
+                                    <p:anim calcmode="lin" valueType="num">
+                                      <p:cBhvr>
+                                        <p:cTn id="8" dur="1000" fill="hold"/>
+                                        <p:tgtEl>
+                                          <p:spTgt spid="4"/>
+                                        </p:tgtEl>
+                                        <p:attrNameLst>
+                                          <p:attrName>ppt_x</p:attrName>
+                                        </p:attrNameLst>
+                                      </p:cBhvr>
+                                      <p:tavLst>
+                                        <p:tav tm="0">
+                                          <p:val>
+                                            <p:strVal val="#ppt_x"/>
+                                          </p:val>
+                                        </p:tav>
+                                        <p:tav tm="100000">
+                                          <p:val>
+                                            <p:strVal val="#ppt_x"/>
+                                          </p:val>
+                                        </p:tav>
+                                      </p:tavLst>
+                                    </p:anim>
+                                    <p:anim calcmode="lin" valueType="num">
+                                      <p:cBhvr>
+                                        <p:cTn id="9" dur="1000" fill="hold"/>
+                                        <p:tgtEl>
+                                          <p:spTgt spid="4"/>
+                                        </p:tgtEl>
+                                        <p:attrNameLst>
+                                          <p:attrName>ppt_y</p:attrName>
+                                        </p:attrNameLst>
+                                      </p:cBhvr>
+                                      <p:tavLst>
+                                        <p:tav tm="0">
+                                          <p:val>
+                                            <p:strVal val="#ppt_y+.1"/>
+                                          </p:val>
+                                        </p:tav>
+                                        <p:tav tm="100000">
+                                          <p:val>
+                                            <p:strVal val="#ppt_y"/>
+                                          </p:val>
+                                        </p:tav>
+                                      </p:tavLst>
+                                    </p:anim>
+                                  </p:childTnLst>
+                                </p:cTn>
+                              </p:par>
+                            </p:childTnLst>
+                          </p:cTn>
+                        </p:par>
+                      </p:childTnLst>
+                    </p:cTn>
+                  </p:par>
+                  <p:par>
+                    <p:cTn id="10" fill="hold">
+                      <p:stCondLst>
+                        <p:cond delay="indefinite"/>
+                      </p:stCondLst>
+                      <p:childTnLst>
+                        <p:par>
+                          <p:cTn id="11" fill="hold">
+                            <p:stCondLst>
+                              <p:cond delay="0"/>
+                            </p:stCondLst>
+                            <p:childTnLst>
+                              <p:par>
+                                <p:cTn id="12" presetID="2" presetClass="entr" presetSubtype="4" fill="hold" grpId="0" nodeType="clickEffect">
+                                  <p:stCondLst>
+                                    <p:cond delay="0"/>
+                                  </p:stCondLst>
+                                  <p:childTnLst>
+                                    <p:set>
+                                      <p:cBhvr>
+                                        <p:cTn id="13" dur="1" fill="hold">
+                                          <p:stCondLst>
+                                            <p:cond delay="0"/>
+                                          </p:stCondLst>
+                                        </p:cTn>
+                                        <p:tgtEl>
+                                          <p:spTgt spid="5">
+                                            <p:graphicEl>
+                                              <a:dgm id="{38D7097B-E3BF-4E75-B3F8-30441BC76571}"/>
+                                            </p:graphicEl>
+                                          </p:spTgt>
+                                        </p:tgtEl>
+                                        <p:attrNameLst>
+                                          <p:attrName>style.visibility</p:attrName>
+                                        </p:attrNameLst>
+                                      </p:cBhvr>
+                                      <p:to>
+                                        <p:strVal val="visible"/>
+                                      </p:to>
+                                    </p:set>
+                                    <p:anim calcmode="lin" valueType="num">
+                                      <p:cBhvr additive="base">
+                                        <p:cTn id="14" dur="500" fill="hold"/>
+                                        <p:tgtEl>
+                                          <p:spTgt spid="5">
+                                            <p:graphicEl>
+                                              <a:dgm id="{38D7097B-E3BF-4E75-B3F8-30441BC76571}"/>
+                                            </p:graphicEl>
+                                          </p:spTgt>
+                                        </p:tgtEl>
+                                        <p:attrNameLst>
+                                          <p:attrName>ppt_x</p:attrName>
+                                        </p:attrNameLst>
+                                      </p:cBhvr>
+                                      <p:tavLst>
+                                        <p:tav tm="0">
+                                          <p:val>
+                                            <p:strVal val="#ppt_x"/>
+                                          </p:val>
+                                        </p:tav>
+                                        <p:tav tm="100000">
+                                          <p:val>
+                                            <p:strVal val="#ppt_x"/>
+                                          </p:val>
+                                        </p:tav>
+                                      </p:tavLst>
+                                    </p:anim>
+                                    <p:anim calcmode="lin" valueType="num">
+                                      <p:cBhvr additive="base">
+                                        <p:cTn id="15" dur="500" fill="hold"/>
+                                        <p:tgtEl>
+                                          <p:spTgt spid="5">
+                                            <p:graphicEl>
+                                              <a:dgm id="{38D7097B-E3BF-4E75-B3F8-30441BC76571}"/>
+                                            </p:graphicEl>
+                                          </p:spTgt>
+                                        </p:tgtEl>
+                                        <p:attrNameLst>
+                                          <p:attrName>ppt_y</p:attrName>
+                                        </p:attrNameLst>
+                                      </p:cBhvr>
+                                      <p:tavLst>
+                                        <p:tav tm="0">
+                                          <p:val>
+                                            <p:strVal val="1+#ppt_h/2"/>
+                                          </p:val>
+                                        </p:tav>
+                                        <p:tav tm="100000">
+                                          <p:val>
+                                            <p:strVal val="#ppt_y"/>
+                                          </p:val>
+                                        </p:tav>
+                                      </p:tavLst>
+                                    </p:anim>
+                                  </p:childTnLst>
+                                </p:cTn>
+                              </p:par>
+                              <p:par>
+                                <p:cTn id="16" presetID="2" presetClass="entr" presetSubtype="4" fill="hold" grpId="0" nodeType="withEffect">
+                                  <p:stCondLst>
+                                    <p:cond delay="0"/>
+                                  </p:stCondLst>
+                                  <p:childTnLst>
+                                    <p:set>
+                                      <p:cBhvr>
+                                        <p:cTn id="17" dur="1" fill="hold">
+                                          <p:stCondLst>
+                                            <p:cond delay="0"/>
+                                          </p:stCondLst>
+                                        </p:cTn>
+                                        <p:tgtEl>
+                                          <p:spTgt spid="5">
+                                            <p:graphicEl>
+                                              <a:dgm id="{BEC47173-B43D-440A-B071-F5E713476F86}"/>
+                                            </p:graphicEl>
+                                          </p:spTgt>
+                                        </p:tgtEl>
+                                        <p:attrNameLst>
+                                          <p:attrName>style.visibility</p:attrName>
+                                        </p:attrNameLst>
+                                      </p:cBhvr>
+                                      <p:to>
+                                        <p:strVal val="visible"/>
+                                      </p:to>
+                                    </p:set>
+                                    <p:anim calcmode="lin" valueType="num">
+                                      <p:cBhvr additive="base">
+                                        <p:cTn id="18" dur="500" fill="hold"/>
+                                        <p:tgtEl>
+                                          <p:spTgt spid="5">
+                                            <p:graphicEl>
+                                              <a:dgm id="{BEC47173-B43D-440A-B071-F5E713476F86}"/>
+                                            </p:graphicEl>
+                                          </p:spTgt>
+                                        </p:tgtEl>
+                                        <p:attrNameLst>
+                                          <p:attrName>ppt_x</p:attrName>
+                                        </p:attrNameLst>
+                                      </p:cBhvr>
+                                      <p:tavLst>
+                                        <p:tav tm="0">
+                                          <p:val>
+                                            <p:strVal val="#ppt_x"/>
+                                          </p:val>
+                                        </p:tav>
+                                        <p:tav tm="100000">
+                                          <p:val>
+                                            <p:strVal val="#ppt_x"/>
+                                          </p:val>
+                                        </p:tav>
+                                      </p:tavLst>
+                                    </p:anim>
+                                    <p:anim calcmode="lin" valueType="num">
+                                      <p:cBhvr additive="base">
+                                        <p:cTn id="19" dur="500" fill="hold"/>
+                                        <p:tgtEl>
+                                          <p:spTgt spid="5">
+                                            <p:graphicEl>
+                                              <a:dgm id="{BEC47173-B43D-440A-B071-F5E713476F86}"/>
+                                            </p:graphicEl>
+                                          </p:spTgt>
+                                        </p:tgtEl>
+                                        <p:attrNameLst>
+                                          <p:attrName>ppt_y</p:attrName>
+                                        </p:attrNameLst>
+                                      </p:cBhvr>
+                                      <p:tavLst>
+                                        <p:tav tm="0">
+                                          <p:val>
+                                            <p:strVal val="1+#ppt_h/2"/>
+                                          </p:val>
+                                        </p:tav>
+                                        <p:tav tm="100000">
+                                          <p:val>
+                                            <p:strVal val="#ppt_y"/>
+                                          </p:val>
+                                        </p:tav>
+                                      </p:tavLst>
+                                    </p:anim>
+                                  </p:childTnLst>
+                                </p:cTn>
+                              </p:par>
+                              <p:par>
+                                <p:cTn id="20" presetID="2" presetClass="entr" presetSubtype="4" fill="hold" grpId="0" nodeType="withEffect">
+                                  <p:stCondLst>
+                                    <p:cond delay="0"/>
+                                  </p:stCondLst>
+                                  <p:childTnLst>
+                                    <p:set>
+                                      <p:cBhvr>
+                                        <p:cTn id="21" dur="1" fill="hold">
+                                          <p:stCondLst>
+                                            <p:cond delay="0"/>
+                                          </p:stCondLst>
+                                        </p:cTn>
+                                        <p:tgtEl>
+                                          <p:spTgt spid="5">
+                                            <p:graphicEl>
+                                              <a:dgm id="{58BCEC67-4411-4ED3-916F-4805CF94175C}"/>
+                                            </p:graphicEl>
+                                          </p:spTgt>
+                                        </p:tgtEl>
+                                        <p:attrNameLst>
+                                          <p:attrName>style.visibility</p:attrName>
+                                        </p:attrNameLst>
+                                      </p:cBhvr>
+                                      <p:to>
+                                        <p:strVal val="visible"/>
+                                      </p:to>
+                                    </p:set>
+                                    <p:anim calcmode="lin" valueType="num">
+                                      <p:cBhvr additive="base">
+                                        <p:cTn id="22" dur="500" fill="hold"/>
+                                        <p:tgtEl>
+                                          <p:spTgt spid="5">
+                                            <p:graphicEl>
+                                              <a:dgm id="{58BCEC67-4411-4ED3-916F-4805CF94175C}"/>
+                                            </p:graphicEl>
+                                          </p:spTgt>
+                                        </p:tgtEl>
+                                        <p:attrNameLst>
+                                          <p:attrName>ppt_x</p:attrName>
+                                        </p:attrNameLst>
+                                      </p:cBhvr>
+                                      <p:tavLst>
+                                        <p:tav tm="0">
+                                          <p:val>
+                                            <p:strVal val="#ppt_x"/>
+                                          </p:val>
+                                        </p:tav>
+                                        <p:tav tm="100000">
+                                          <p:val>
+                                            <p:strVal val="#ppt_x"/>
+                                          </p:val>
+                                        </p:tav>
+                                      </p:tavLst>
+                                    </p:anim>
+                                    <p:anim calcmode="lin" valueType="num">
+                                      <p:cBhvr additive="base">
+                                        <p:cTn id="23" dur="500" fill="hold"/>
+                                        <p:tgtEl>
+                                          <p:spTgt spid="5">
+                                            <p:graphicEl>
+                                              <a:dgm id="{58BCEC67-4411-4ED3-916F-4805CF94175C}"/>
+                                            </p:graphicEl>
+                                          </p:spTgt>
+                                        </p:tgtEl>
+                                        <p:attrNameLst>
+                                          <p:attrName>ppt_y</p:attrName>
+                                        </p:attrNameLst>
+                                      </p:cBhvr>
+                                      <p:tavLst>
+                                        <p:tav tm="0">
+                                          <p:val>
+                                            <p:strVal val="1+#ppt_h/2"/>
+                                          </p:val>
+                                        </p:tav>
+                                        <p:tav tm="100000">
+                                          <p:val>
+                                            <p:strVal val="#ppt_y"/>
+                                          </p:val>
+                                        </p:tav>
+                                      </p:tavLst>
+                                    </p:anim>
+                                  </p:childTnLst>
+                                </p:cTn>
+                              </p:par>
+                            </p:childTnLst>
+                          </p:cTn>
+                        </p:par>
+                      </p:childTnLst>
+                    </p:cTn>
+                  </p:par>
+                  <p:par>
+                    <p:cTn id="24" fill="hold">
+                      <p:stCondLst>
+                        <p:cond delay="indefinite"/>
+                      </p:stCondLst>
+                      <p:childTnLst>
+                        <p:par>
+                          <p:cTn id="25" fill="hold">
+                            <p:stCondLst>
+                              <p:cond delay="0"/>
+                            </p:stCondLst>
+                            <p:childTnLst>
+                              <p:par>
+                                <p:cTn id="26" presetID="2" presetClass="entr" presetSubtype="4" fill="hold" grpId="0" nodeType="clickEffect">
+                                  <p:stCondLst>
+                                    <p:cond delay="0"/>
+                                  </p:stCondLst>
+                                  <p:childTnLst>
+                                    <p:set>
+                                      <p:cBhvr>
+                                        <p:cTn id="27" dur="1" fill="hold">
+                                          <p:stCondLst>
+                                            <p:cond delay="0"/>
+                                          </p:stCondLst>
+                                        </p:cTn>
+                                        <p:tgtEl>
+                                          <p:spTgt spid="5">
+                                            <p:graphicEl>
+                                              <a:dgm id="{0A47A22E-595E-4C1F-B7C6-0EF1B4F19368}"/>
+                                            </p:graphicEl>
+                                          </p:spTgt>
+                                        </p:tgtEl>
+                                        <p:attrNameLst>
+                                          <p:attrName>style.visibility</p:attrName>
+                                        </p:attrNameLst>
+                                      </p:cBhvr>
+                                      <p:to>
+                                        <p:strVal val="visible"/>
+                                      </p:to>
+                                    </p:set>
+                                    <p:anim calcmode="lin" valueType="num">
+                                      <p:cBhvr additive="base">
+                                        <p:cTn id="28" dur="500" fill="hold"/>
+                                        <p:tgtEl>
+                                          <p:spTgt spid="5">
+                                            <p:graphicEl>
+                                              <a:dgm id="{0A47A22E-595E-4C1F-B7C6-0EF1B4F19368}"/>
+                                            </p:graphicEl>
+                                          </p:spTgt>
+                                        </p:tgtEl>
+                                        <p:attrNameLst>
+                                          <p:attrName>ppt_x</p:attrName>
+                                        </p:attrNameLst>
+                                      </p:cBhvr>
+                                      <p:tavLst>
+                                        <p:tav tm="0">
+                                          <p:val>
+                                            <p:strVal val="#ppt_x"/>
+                                          </p:val>
+                                        </p:tav>
+                                        <p:tav tm="100000">
+                                          <p:val>
+                                            <p:strVal val="#ppt_x"/>
+                                          </p:val>
+                                        </p:tav>
+                                      </p:tavLst>
+                                    </p:anim>
+                                    <p:anim calcmode="lin" valueType="num">
+                                      <p:cBhvr additive="base">
+                                        <p:cTn id="29" dur="500" fill="hold"/>
+                                        <p:tgtEl>
+                                          <p:spTgt spid="5">
+                                            <p:graphicEl>
+                                              <a:dgm id="{0A47A22E-595E-4C1F-B7C6-0EF1B4F19368}"/>
+                                            </p:graphicEl>
+                                          </p:spTgt>
+                                        </p:tgtEl>
+                                        <p:attrNameLst>
+                                          <p:attrName>ppt_y</p:attrName>
+                                        </p:attrNameLst>
+                                      </p:cBhvr>
+                                      <p:tavLst>
+                                        <p:tav tm="0">
+                                          <p:val>
+                                            <p:strVal val="1+#ppt_h/2"/>
+                                          </p:val>
+                                        </p:tav>
+                                        <p:tav tm="100000">
+                                          <p:val>
+                                            <p:strVal val="#ppt_y"/>
+                                          </p:val>
+                                        </p:tav>
+                                      </p:tavLst>
+                                    </p:anim>
+                                  </p:childTnLst>
+                                </p:cTn>
+                              </p:par>
+                              <p:par>
+                                <p:cTn id="30" presetID="2" presetClass="entr" presetSubtype="4" fill="hold" grpId="0" nodeType="withEffect">
+                                  <p:stCondLst>
+                                    <p:cond delay="0"/>
+                                  </p:stCondLst>
+                                  <p:childTnLst>
+                                    <p:set>
+                                      <p:cBhvr>
+                                        <p:cTn id="31" dur="1" fill="hold">
+                                          <p:stCondLst>
+                                            <p:cond delay="0"/>
+                                          </p:stCondLst>
+                                        </p:cTn>
+                                        <p:tgtEl>
+                                          <p:spTgt spid="5">
+                                            <p:graphicEl>
+                                              <a:dgm id="{AC72BA76-548A-4DBB-8925-4225F3E0BFD8}"/>
+                                            </p:graphicEl>
+                                          </p:spTgt>
+                                        </p:tgtEl>
+                                        <p:attrNameLst>
+                                          <p:attrName>style.visibility</p:attrName>
+                                        </p:attrNameLst>
+                                      </p:cBhvr>
+                                      <p:to>
+                                        <p:strVal val="visible"/>
+                                      </p:to>
+                                    </p:set>
+                                    <p:anim calcmode="lin" valueType="num">
+                                      <p:cBhvr additive="base">
+                                        <p:cTn id="32" dur="500" fill="hold"/>
+                                        <p:tgtEl>
+                                          <p:spTgt spid="5">
+                                            <p:graphicEl>
+                                              <a:dgm id="{AC72BA76-548A-4DBB-8925-4225F3E0BFD8}"/>
+                                            </p:graphicEl>
+                                          </p:spTgt>
+                                        </p:tgtEl>
+                                        <p:attrNameLst>
+                                          <p:attrName>ppt_x</p:attrName>
+                                        </p:attrNameLst>
+                                      </p:cBhvr>
+                                      <p:tavLst>
+                                        <p:tav tm="0">
+                                          <p:val>
+                                            <p:strVal val="#ppt_x"/>
+                                          </p:val>
+                                        </p:tav>
+                                        <p:tav tm="100000">
+                                          <p:val>
+                                            <p:strVal val="#ppt_x"/>
+                                          </p:val>
+                                        </p:tav>
+                                      </p:tavLst>
+                                    </p:anim>
+                                    <p:anim calcmode="lin" valueType="num">
+                                      <p:cBhvr additive="base">
+                                        <p:cTn id="33" dur="500" fill="hold"/>
+                                        <p:tgtEl>
+                                          <p:spTgt spid="5">
+                                            <p:graphicEl>
+                                              <a:dgm id="{AC72BA76-548A-4DBB-8925-4225F3E0BFD8}"/>
+                                            </p:graphicEl>
+                                          </p:spTgt>
+                                        </p:tgtEl>
+                                        <p:attrNameLst>
+                                          <p:attrName>ppt_y</p:attrName>
+                                        </p:attrNameLst>
+                                      </p:cBhvr>
+                                      <p:tavLst>
+                                        <p:tav tm="0">
+                                          <p:val>
+                                            <p:strVal val="1+#ppt_h/2"/>
+                                          </p:val>
+                                        </p:tav>
+                                        <p:tav tm="100000">
+                                          <p:val>
+                                            <p:strVal val="#ppt_y"/>
+                                          </p:val>
+                                        </p:tav>
+                                      </p:tavLst>
+                                    </p:anim>
+                                  </p:childTnLst>
+                                </p:cTn>
+                              </p:par>
+                            </p:childTnLst>
+                          </p:cTn>
+                        </p:par>
+                      </p:childTnLst>
+                    </p:cTn>
+                  </p:par>
+                  <p:par>
+                    <p:cTn id="34" fill="hold">
+                      <p:stCondLst>
+                        <p:cond delay="indefinite"/>
+                      </p:stCondLst>
+                      <p:childTnLst>
+                        <p:par>
+                          <p:cTn id="35" fill="hold">
+                            <p:stCondLst>
+                              <p:cond delay="0"/>
+                            </p:stCondLst>
+                            <p:childTnLst>
+                              <p:par>
+                                <p:cTn id="36" presetID="2" presetClass="entr" presetSubtype="4" fill="hold" grpId="0" nodeType="clickEffect">
+                                  <p:stCondLst>
+                                    <p:cond delay="0"/>
+                                  </p:stCondLst>
+                                  <p:childTnLst>
+                                    <p:set>
+                                      <p:cBhvr>
+                                        <p:cTn id="37" dur="1" fill="hold">
+                                          <p:stCondLst>
+                                            <p:cond delay="0"/>
+                                          </p:stCondLst>
+                                        </p:cTn>
+                                        <p:tgtEl>
+                                          <p:spTgt spid="5">
+                                            <p:graphicEl>
+                                              <a:dgm id="{A7036FD2-AF1B-4FDC-94DA-3E29AEDA80E6}"/>
+                                            </p:graphicEl>
+                                          </p:spTgt>
+                                        </p:tgtEl>
+                                        <p:attrNameLst>
+                                          <p:attrName>style.visibility</p:attrName>
+                                        </p:attrNameLst>
+                                      </p:cBhvr>
+                                      <p:to>
+                                        <p:strVal val="visible"/>
+                                      </p:to>
+                                    </p:set>
+                                    <p:anim calcmode="lin" valueType="num">
+                                      <p:cBhvr additive="base">
+                                        <p:cTn id="38" dur="500" fill="hold"/>
+                                        <p:tgtEl>
+                                          <p:spTgt spid="5">
+                                            <p:graphicEl>
+                                              <a:dgm id="{A7036FD2-AF1B-4FDC-94DA-3E29AEDA80E6}"/>
+                                            </p:graphicEl>
+                                          </p:spTgt>
+                                        </p:tgtEl>
+                                        <p:attrNameLst>
+                                          <p:attrName>ppt_x</p:attrName>
+                                        </p:attrNameLst>
+                                      </p:cBhvr>
+                                      <p:tavLst>
+                                        <p:tav tm="0">
+                                          <p:val>
+                                            <p:strVal val="#ppt_x"/>
+                                          </p:val>
+                                        </p:tav>
+                                        <p:tav tm="100000">
+                                          <p:val>
+                                            <p:strVal val="#ppt_x"/>
+                                          </p:val>
+                                        </p:tav>
+                                      </p:tavLst>
+                                    </p:anim>
+                                    <p:anim calcmode="lin" valueType="num">
+                                      <p:cBhvr additive="base">
+                                        <p:cTn id="39" dur="500" fill="hold"/>
+                                        <p:tgtEl>
+                                          <p:spTgt spid="5">
+                                            <p:graphicEl>
+                                              <a:dgm id="{A7036FD2-AF1B-4FDC-94DA-3E29AEDA80E6}"/>
+                                            </p:graphicEl>
+                                          </p:spTgt>
+                                        </p:tgtEl>
+                                        <p:attrNameLst>
+                                          <p:attrName>ppt_y</p:attrName>
+                                        </p:attrNameLst>
+                                      </p:cBhvr>
+                                      <p:tavLst>
+                                        <p:tav tm="0">
+                                          <p:val>
+                                            <p:strVal val="1+#ppt_h/2"/>
+                                          </p:val>
+                                        </p:tav>
+                                        <p:tav tm="100000">
+                                          <p:val>
+                                            <p:strVal val="#ppt_y"/>
+                                          </p:val>
+                                        </p:tav>
+                                      </p:tavLst>
+                                    </p:anim>
+                                  </p:childTnLst>
+                                </p:cTn>
+                              </p:par>
+                              <p:par>
+                                <p:cTn id="40" presetID="2" presetClass="entr" presetSubtype="4" fill="hold" grpId="0" nodeType="withEffect">
+                                  <p:stCondLst>
+                                    <p:cond delay="0"/>
+                                  </p:stCondLst>
+                                  <p:childTnLst>
+                                    <p:set>
+                                      <p:cBhvr>
+                                        <p:cTn id="41" dur="1" fill="hold">
+                                          <p:stCondLst>
+                                            <p:cond delay="0"/>
+                                          </p:stCondLst>
+                                        </p:cTn>
+                                        <p:tgtEl>
+                                          <p:spTgt spid="5">
+                                            <p:graphicEl>
+                                              <a:dgm id="{A18F5808-8715-4B58-8E6F-C9CA03098757}"/>
+                                            </p:graphicEl>
+                                          </p:spTgt>
+                                        </p:tgtEl>
+                                        <p:attrNameLst>
+                                          <p:attrName>style.visibility</p:attrName>
+                                        </p:attrNameLst>
+                                      </p:cBhvr>
+                                      <p:to>
+                                        <p:strVal val="visible"/>
+                                      </p:to>
+                                    </p:set>
+                                    <p:anim calcmode="lin" valueType="num">
+                                      <p:cBhvr additive="base">
+                                        <p:cTn id="42" dur="500" fill="hold"/>
+                                        <p:tgtEl>
+                                          <p:spTgt spid="5">
+                                            <p:graphicEl>
+                                              <a:dgm id="{A18F5808-8715-4B58-8E6F-C9CA03098757}"/>
+                                            </p:graphicEl>
+                                          </p:spTgt>
+                                        </p:tgtEl>
+                                        <p:attrNameLst>
+                                          <p:attrName>ppt_x</p:attrName>
+                                        </p:attrNameLst>
+                                      </p:cBhvr>
+                                      <p:tavLst>
+                                        <p:tav tm="0">
+                                          <p:val>
+                                            <p:strVal val="#ppt_x"/>
+                                          </p:val>
+                                        </p:tav>
+                                        <p:tav tm="100000">
+                                          <p:val>
+                                            <p:strVal val="#ppt_x"/>
+                                          </p:val>
+                                        </p:tav>
+                                      </p:tavLst>
+                                    </p:anim>
+                                    <p:anim calcmode="lin" valueType="num">
+                                      <p:cBhvr additive="base">
+                                        <p:cTn id="43" dur="500" fill="hold"/>
+                                        <p:tgtEl>
+                                          <p:spTgt spid="5">
+                                            <p:graphicEl>
+                                              <a:dgm id="{A18F5808-8715-4B58-8E6F-C9CA03098757}"/>
+                                            </p:graphicEl>
+                                          </p:spTgt>
+                                        </p:tgtEl>
+                                        <p:attrNameLst>
+                                          <p:attrName>ppt_y</p:attrName>
+                                        </p:attrNameLst>
+                                      </p:cBhvr>
+                                      <p:tavLst>
+                                        <p:tav tm="0">
+                                          <p:val>
+                                            <p:strVal val="1+#ppt_h/2"/>
+                                          </p:val>
+                                        </p:tav>
+                                        <p:tav tm="100000">
+                                          <p:val>
+                                            <p:strVal val="#ppt_y"/>
+                                          </p:val>
+                                        </p:tav>
+                                      </p:tavLst>
+                                    </p:anim>
+                                  </p:childTnLst>
+                                </p:cTn>
+                              </p:par>
+                            </p:childTnLst>
+                          </p:cTn>
+                        </p:par>
+                      </p:childTnLst>
+                    </p:cTn>
+                  </p:par>
+                </p:childTnLst>
+              </p:cTn>
+              <p:prevCondLst>
+                <p:cond evt="onPrev" delay="0">
+                  <p:tgtEl>
+                    <p:sldTgt/>
+                  </p:tgtEl>
+                </p:cond>
+              </p:prevCondLst>
+              <p:nextCondLst>
+                <p:cond evt="onNext" delay="0">
+                  <p:tgtEl>
+                    <p:sldTgt/>
+                  </p:tgtEl>
+                </p:cond>
+              </p:nextCondLst>
+            </p:seq>
+          </p:childTnLst>
+        </p:cTn>
+      </p:par>
+    </p:tnLst>
+    <p:bldLst>
+      <p:bldGraphic spid="5" grpId="0">
+        <p:bldSub>
+          <a:bldDgm bld="one"/>
+        </p:bldSub>
+      </p:bldGraphic>
+    </p:bldLst>
+  </p:timing>
 </p:sld>
 </file>
 
@@ -20741,6 +23083,276 @@
   <p:clrMapOvr>
     <a:masterClrMapping/>
   </p:clrMapOvr>
+  <p:timing>
+    <p:tnLst>
+      <p:par>
+        <p:cTn id="1" dur="indefinite" restart="never" nodeType="tmRoot">
+          <p:childTnLst>
+            <p:seq concurrent="1" nextAc="seek">
+              <p:cTn id="2" dur="indefinite" nodeType="mainSeq">
+                <p:childTnLst>
+                  <p:par>
+                    <p:cTn id="3" fill="hold">
+                      <p:stCondLst>
+                        <p:cond delay="indefinite"/>
+                      </p:stCondLst>
+                      <p:childTnLst>
+                        <p:par>
+                          <p:cTn id="4" fill="hold">
+                            <p:stCondLst>
+                              <p:cond delay="0"/>
+                            </p:stCondLst>
+                            <p:childTnLst>
+                              <p:par>
+                                <p:cTn id="5" presetID="2" presetClass="entr" presetSubtype="8" fill="hold" grpId="0" nodeType="clickEffect">
+                                  <p:stCondLst>
+                                    <p:cond delay="0"/>
+                                  </p:stCondLst>
+                                  <p:childTnLst>
+                                    <p:set>
+                                      <p:cBhvr>
+                                        <p:cTn id="6" dur="1" fill="hold">
+                                          <p:stCondLst>
+                                            <p:cond delay="0"/>
+                                          </p:stCondLst>
+                                        </p:cTn>
+                                        <p:tgtEl>
+                                          <p:spTgt spid="4"/>
+                                        </p:tgtEl>
+                                        <p:attrNameLst>
+                                          <p:attrName>style.visibility</p:attrName>
+                                        </p:attrNameLst>
+                                      </p:cBhvr>
+                                      <p:to>
+                                        <p:strVal val="visible"/>
+                                      </p:to>
+                                    </p:set>
+                                    <p:anim calcmode="lin" valueType="num">
+                                      <p:cBhvr additive="base">
+                                        <p:cTn id="7" dur="500" fill="hold"/>
+                                        <p:tgtEl>
+                                          <p:spTgt spid="4"/>
+                                        </p:tgtEl>
+                                        <p:attrNameLst>
+                                          <p:attrName>ppt_x</p:attrName>
+                                        </p:attrNameLst>
+                                      </p:cBhvr>
+                                      <p:tavLst>
+                                        <p:tav tm="0">
+                                          <p:val>
+                                            <p:strVal val="0-#ppt_w/2"/>
+                                          </p:val>
+                                        </p:tav>
+                                        <p:tav tm="100000">
+                                          <p:val>
+                                            <p:strVal val="#ppt_x"/>
+                                          </p:val>
+                                        </p:tav>
+                                      </p:tavLst>
+                                    </p:anim>
+                                    <p:anim calcmode="lin" valueType="num">
+                                      <p:cBhvr additive="base">
+                                        <p:cTn id="8" dur="500" fill="hold"/>
+                                        <p:tgtEl>
+                                          <p:spTgt spid="4"/>
+                                        </p:tgtEl>
+                                        <p:attrNameLst>
+                                          <p:attrName>ppt_y</p:attrName>
+                                        </p:attrNameLst>
+                                      </p:cBhvr>
+                                      <p:tavLst>
+                                        <p:tav tm="0">
+                                          <p:val>
+                                            <p:strVal val="#ppt_y"/>
+                                          </p:val>
+                                        </p:tav>
+                                        <p:tav tm="100000">
+                                          <p:val>
+                                            <p:strVal val="#ppt_y"/>
+                                          </p:val>
+                                        </p:tav>
+                                      </p:tavLst>
+                                    </p:anim>
+                                  </p:childTnLst>
+                                </p:cTn>
+                              </p:par>
+                            </p:childTnLst>
+                          </p:cTn>
+                        </p:par>
+                      </p:childTnLst>
+                    </p:cTn>
+                  </p:par>
+                  <p:par>
+                    <p:cTn id="9" fill="hold">
+                      <p:stCondLst>
+                        <p:cond delay="indefinite"/>
+                      </p:stCondLst>
+                      <p:childTnLst>
+                        <p:par>
+                          <p:cTn id="10" fill="hold">
+                            <p:stCondLst>
+                              <p:cond delay="0"/>
+                            </p:stCondLst>
+                            <p:childTnLst>
+                              <p:par>
+                                <p:cTn id="11" presetID="10" presetClass="entr" presetSubtype="0" fill="hold" grpId="0" nodeType="clickEffect">
+                                  <p:stCondLst>
+                                    <p:cond delay="0"/>
+                                  </p:stCondLst>
+                                  <p:childTnLst>
+                                    <p:set>
+                                      <p:cBhvr>
+                                        <p:cTn id="12" dur="1" fill="hold">
+                                          <p:stCondLst>
+                                            <p:cond delay="0"/>
+                                          </p:stCondLst>
+                                        </p:cTn>
+                                        <p:tgtEl>
+                                          <p:spTgt spid="5"/>
+                                        </p:tgtEl>
+                                        <p:attrNameLst>
+                                          <p:attrName>style.visibility</p:attrName>
+                                        </p:attrNameLst>
+                                      </p:cBhvr>
+                                      <p:to>
+                                        <p:strVal val="visible"/>
+                                      </p:to>
+                                    </p:set>
+                                    <p:animEffect transition="in" filter="fade">
+                                      <p:cBhvr>
+                                        <p:cTn id="13" dur="500"/>
+                                        <p:tgtEl>
+                                          <p:spTgt spid="5"/>
+                                        </p:tgtEl>
+                                      </p:cBhvr>
+                                    </p:animEffect>
+                                  </p:childTnLst>
+                                </p:cTn>
+                              </p:par>
+                            </p:childTnLst>
+                          </p:cTn>
+                        </p:par>
+                      </p:childTnLst>
+                    </p:cTn>
+                  </p:par>
+                  <p:par>
+                    <p:cTn id="14" fill="hold">
+                      <p:stCondLst>
+                        <p:cond delay="indefinite"/>
+                      </p:stCondLst>
+                      <p:childTnLst>
+                        <p:par>
+                          <p:cTn id="15" fill="hold">
+                            <p:stCondLst>
+                              <p:cond delay="0"/>
+                            </p:stCondLst>
+                            <p:childTnLst>
+                              <p:par>
+                                <p:cTn id="16" presetID="2" presetClass="entr" presetSubtype="2" fill="hold" grpId="0" nodeType="clickEffect">
+                                  <p:stCondLst>
+                                    <p:cond delay="0"/>
+                                  </p:stCondLst>
+                                  <p:childTnLst>
+                                    <p:set>
+                                      <p:cBhvr>
+                                        <p:cTn id="17" dur="1" fill="hold">
+                                          <p:stCondLst>
+                                            <p:cond delay="0"/>
+                                          </p:stCondLst>
+                                        </p:cTn>
+                                        <p:tgtEl>
+                                          <p:spTgt spid="6"/>
+                                        </p:tgtEl>
+                                        <p:attrNameLst>
+                                          <p:attrName>style.visibility</p:attrName>
+                                        </p:attrNameLst>
+                                      </p:cBhvr>
+                                      <p:to>
+                                        <p:strVal val="visible"/>
+                                      </p:to>
+                                    </p:set>
+                                    <p:anim calcmode="lin" valueType="num">
+                                      <p:cBhvr additive="base">
+                                        <p:cTn id="18" dur="500" fill="hold"/>
+                                        <p:tgtEl>
+                                          <p:spTgt spid="6"/>
+                                        </p:tgtEl>
+                                        <p:attrNameLst>
+                                          <p:attrName>ppt_x</p:attrName>
+                                        </p:attrNameLst>
+                                      </p:cBhvr>
+                                      <p:tavLst>
+                                        <p:tav tm="0">
+                                          <p:val>
+                                            <p:strVal val="1+#ppt_w/2"/>
+                                          </p:val>
+                                        </p:tav>
+                                        <p:tav tm="100000">
+                                          <p:val>
+                                            <p:strVal val="#ppt_x"/>
+                                          </p:val>
+                                        </p:tav>
+                                      </p:tavLst>
+                                    </p:anim>
+                                    <p:anim calcmode="lin" valueType="num">
+                                      <p:cBhvr additive="base">
+                                        <p:cTn id="19" dur="500" fill="hold"/>
+                                        <p:tgtEl>
+                                          <p:spTgt spid="6"/>
+                                        </p:tgtEl>
+                                        <p:attrNameLst>
+                                          <p:attrName>ppt_y</p:attrName>
+                                        </p:attrNameLst>
+                                      </p:cBhvr>
+                                      <p:tavLst>
+                                        <p:tav tm="0">
+                                          <p:val>
+                                            <p:strVal val="#ppt_y"/>
+                                          </p:val>
+                                        </p:tav>
+                                        <p:tav tm="100000">
+                                          <p:val>
+                                            <p:strVal val="#ppt_y"/>
+                                          </p:val>
+                                        </p:tav>
+                                      </p:tavLst>
+                                    </p:anim>
+                                  </p:childTnLst>
+                                </p:cTn>
+                              </p:par>
+                            </p:childTnLst>
+                          </p:cTn>
+                        </p:par>
+                      </p:childTnLst>
+                    </p:cTn>
+                  </p:par>
+                </p:childTnLst>
+              </p:cTn>
+              <p:prevCondLst>
+                <p:cond evt="onPrev" delay="0">
+                  <p:tgtEl>
+                    <p:sldTgt/>
+                  </p:tgtEl>
+                </p:cond>
+              </p:prevCondLst>
+              <p:nextCondLst>
+                <p:cond evt="onNext" delay="0">
+                  <p:tgtEl>
+                    <p:sldTgt/>
+                  </p:tgtEl>
+                </p:cond>
+              </p:nextCondLst>
+            </p:seq>
+          </p:childTnLst>
+        </p:cTn>
+      </p:par>
+    </p:tnLst>
+    <p:bldLst>
+      <p:bldP spid="4" grpId="0" animBg="1"/>
+      <p:bldP spid="5" grpId="0" animBg="1"/>
+      <p:bldP spid="6" grpId="0" animBg="1"/>
+    </p:bldLst>
+  </p:timing>
 </p:sld>
 </file>
 
@@ -20794,7 +23406,7 @@
             <p:ph idx="1"/>
             <p:extLst>
               <p:ext uri="{D42A27DB-BD31-4B8C-83A1-F6EECF244321}">
-                <p14:modId xmlns:p14="http://schemas.microsoft.com/office/powerpoint/2010/main" val="3051289489"/>
+                <p14:modId xmlns:p14="http://schemas.microsoft.com/office/powerpoint/2010/main" val="93345647"/>
               </p:ext>
             </p:extLst>
           </p:nvPr>
@@ -20819,6 +23431,1078 @@
   <p:clrMapOvr>
     <a:masterClrMapping/>
   </p:clrMapOvr>
+  <p:timing>
+    <p:tnLst>
+      <p:par>
+        <p:cTn id="1" dur="indefinite" restart="never" nodeType="tmRoot">
+          <p:childTnLst>
+            <p:seq concurrent="1" nextAc="seek">
+              <p:cTn id="2" dur="indefinite" nodeType="mainSeq">
+                <p:childTnLst>
+                  <p:par>
+                    <p:cTn id="3" fill="hold">
+                      <p:stCondLst>
+                        <p:cond delay="indefinite"/>
+                      </p:stCondLst>
+                      <p:childTnLst>
+                        <p:par>
+                          <p:cTn id="4" fill="hold">
+                            <p:stCondLst>
+                              <p:cond delay="0"/>
+                            </p:stCondLst>
+                            <p:childTnLst>
+                              <p:par>
+                                <p:cTn id="5" presetID="42" presetClass="entr" presetSubtype="0" fill="hold" grpId="0" nodeType="clickEffect">
+                                  <p:stCondLst>
+                                    <p:cond delay="0"/>
+                                  </p:stCondLst>
+                                  <p:childTnLst>
+                                    <p:set>
+                                      <p:cBhvr>
+                                        <p:cTn id="6" dur="1" fill="hold">
+                                          <p:stCondLst>
+                                            <p:cond delay="0"/>
+                                          </p:stCondLst>
+                                        </p:cTn>
+                                        <p:tgtEl>
+                                          <p:spTgt spid="4">
+                                            <p:graphicEl>
+                                              <a:dgm id="{EF1D8AAE-B5F3-4B4A-8D38-6AE551DA8698}"/>
+                                            </p:graphicEl>
+                                          </p:spTgt>
+                                        </p:tgtEl>
+                                        <p:attrNameLst>
+                                          <p:attrName>style.visibility</p:attrName>
+                                        </p:attrNameLst>
+                                      </p:cBhvr>
+                                      <p:to>
+                                        <p:strVal val="visible"/>
+                                      </p:to>
+                                    </p:set>
+                                    <p:animEffect transition="in" filter="fade">
+                                      <p:cBhvr>
+                                        <p:cTn id="7" dur="1000"/>
+                                        <p:tgtEl>
+                                          <p:spTgt spid="4">
+                                            <p:graphicEl>
+                                              <a:dgm id="{EF1D8AAE-B5F3-4B4A-8D38-6AE551DA8698}"/>
+                                            </p:graphicEl>
+                                          </p:spTgt>
+                                        </p:tgtEl>
+                                      </p:cBhvr>
+                                    </p:animEffect>
+                                    <p:anim calcmode="lin" valueType="num">
+                                      <p:cBhvr>
+                                        <p:cTn id="8" dur="1000" fill="hold"/>
+                                        <p:tgtEl>
+                                          <p:spTgt spid="4">
+                                            <p:graphicEl>
+                                              <a:dgm id="{EF1D8AAE-B5F3-4B4A-8D38-6AE551DA8698}"/>
+                                            </p:graphicEl>
+                                          </p:spTgt>
+                                        </p:tgtEl>
+                                        <p:attrNameLst>
+                                          <p:attrName>ppt_x</p:attrName>
+                                        </p:attrNameLst>
+                                      </p:cBhvr>
+                                      <p:tavLst>
+                                        <p:tav tm="0">
+                                          <p:val>
+                                            <p:strVal val="#ppt_x"/>
+                                          </p:val>
+                                        </p:tav>
+                                        <p:tav tm="100000">
+                                          <p:val>
+                                            <p:strVal val="#ppt_x"/>
+                                          </p:val>
+                                        </p:tav>
+                                      </p:tavLst>
+                                    </p:anim>
+                                    <p:anim calcmode="lin" valueType="num">
+                                      <p:cBhvr>
+                                        <p:cTn id="9" dur="1000" fill="hold"/>
+                                        <p:tgtEl>
+                                          <p:spTgt spid="4">
+                                            <p:graphicEl>
+                                              <a:dgm id="{EF1D8AAE-B5F3-4B4A-8D38-6AE551DA8698}"/>
+                                            </p:graphicEl>
+                                          </p:spTgt>
+                                        </p:tgtEl>
+                                        <p:attrNameLst>
+                                          <p:attrName>ppt_y</p:attrName>
+                                        </p:attrNameLst>
+                                      </p:cBhvr>
+                                      <p:tavLst>
+                                        <p:tav tm="0">
+                                          <p:val>
+                                            <p:strVal val="#ppt_y+.1"/>
+                                          </p:val>
+                                        </p:tav>
+                                        <p:tav tm="100000">
+                                          <p:val>
+                                            <p:strVal val="#ppt_y"/>
+                                          </p:val>
+                                        </p:tav>
+                                      </p:tavLst>
+                                    </p:anim>
+                                  </p:childTnLst>
+                                </p:cTn>
+                              </p:par>
+                            </p:childTnLst>
+                          </p:cTn>
+                        </p:par>
+                      </p:childTnLst>
+                    </p:cTn>
+                  </p:par>
+                  <p:par>
+                    <p:cTn id="10" fill="hold">
+                      <p:stCondLst>
+                        <p:cond delay="indefinite"/>
+                      </p:stCondLst>
+                      <p:childTnLst>
+                        <p:par>
+                          <p:cTn id="11" fill="hold">
+                            <p:stCondLst>
+                              <p:cond delay="0"/>
+                            </p:stCondLst>
+                            <p:childTnLst>
+                              <p:par>
+                                <p:cTn id="12" presetID="42" presetClass="entr" presetSubtype="0" fill="hold" grpId="0" nodeType="clickEffect">
+                                  <p:stCondLst>
+                                    <p:cond delay="0"/>
+                                  </p:stCondLst>
+                                  <p:childTnLst>
+                                    <p:set>
+                                      <p:cBhvr>
+                                        <p:cTn id="13" dur="1" fill="hold">
+                                          <p:stCondLst>
+                                            <p:cond delay="0"/>
+                                          </p:stCondLst>
+                                        </p:cTn>
+                                        <p:tgtEl>
+                                          <p:spTgt spid="4">
+                                            <p:graphicEl>
+                                              <a:dgm id="{8C89487D-98DE-4128-9BC2-9C0899D30B13}"/>
+                                            </p:graphicEl>
+                                          </p:spTgt>
+                                        </p:tgtEl>
+                                        <p:attrNameLst>
+                                          <p:attrName>style.visibility</p:attrName>
+                                        </p:attrNameLst>
+                                      </p:cBhvr>
+                                      <p:to>
+                                        <p:strVal val="visible"/>
+                                      </p:to>
+                                    </p:set>
+                                    <p:animEffect transition="in" filter="fade">
+                                      <p:cBhvr>
+                                        <p:cTn id="14" dur="1000"/>
+                                        <p:tgtEl>
+                                          <p:spTgt spid="4">
+                                            <p:graphicEl>
+                                              <a:dgm id="{8C89487D-98DE-4128-9BC2-9C0899D30B13}"/>
+                                            </p:graphicEl>
+                                          </p:spTgt>
+                                        </p:tgtEl>
+                                      </p:cBhvr>
+                                    </p:animEffect>
+                                    <p:anim calcmode="lin" valueType="num">
+                                      <p:cBhvr>
+                                        <p:cTn id="15" dur="1000" fill="hold"/>
+                                        <p:tgtEl>
+                                          <p:spTgt spid="4">
+                                            <p:graphicEl>
+                                              <a:dgm id="{8C89487D-98DE-4128-9BC2-9C0899D30B13}"/>
+                                            </p:graphicEl>
+                                          </p:spTgt>
+                                        </p:tgtEl>
+                                        <p:attrNameLst>
+                                          <p:attrName>ppt_x</p:attrName>
+                                        </p:attrNameLst>
+                                      </p:cBhvr>
+                                      <p:tavLst>
+                                        <p:tav tm="0">
+                                          <p:val>
+                                            <p:strVal val="#ppt_x"/>
+                                          </p:val>
+                                        </p:tav>
+                                        <p:tav tm="100000">
+                                          <p:val>
+                                            <p:strVal val="#ppt_x"/>
+                                          </p:val>
+                                        </p:tav>
+                                      </p:tavLst>
+                                    </p:anim>
+                                    <p:anim calcmode="lin" valueType="num">
+                                      <p:cBhvr>
+                                        <p:cTn id="16" dur="1000" fill="hold"/>
+                                        <p:tgtEl>
+                                          <p:spTgt spid="4">
+                                            <p:graphicEl>
+                                              <a:dgm id="{8C89487D-98DE-4128-9BC2-9C0899D30B13}"/>
+                                            </p:graphicEl>
+                                          </p:spTgt>
+                                        </p:tgtEl>
+                                        <p:attrNameLst>
+                                          <p:attrName>ppt_y</p:attrName>
+                                        </p:attrNameLst>
+                                      </p:cBhvr>
+                                      <p:tavLst>
+                                        <p:tav tm="0">
+                                          <p:val>
+                                            <p:strVal val="#ppt_y+.1"/>
+                                          </p:val>
+                                        </p:tav>
+                                        <p:tav tm="100000">
+                                          <p:val>
+                                            <p:strVal val="#ppt_y"/>
+                                          </p:val>
+                                        </p:tav>
+                                      </p:tavLst>
+                                    </p:anim>
+                                  </p:childTnLst>
+                                </p:cTn>
+                              </p:par>
+                            </p:childTnLst>
+                          </p:cTn>
+                        </p:par>
+                      </p:childTnLst>
+                    </p:cTn>
+                  </p:par>
+                  <p:par>
+                    <p:cTn id="17" fill="hold">
+                      <p:stCondLst>
+                        <p:cond delay="indefinite"/>
+                      </p:stCondLst>
+                      <p:childTnLst>
+                        <p:par>
+                          <p:cTn id="18" fill="hold">
+                            <p:stCondLst>
+                              <p:cond delay="0"/>
+                            </p:stCondLst>
+                            <p:childTnLst>
+                              <p:par>
+                                <p:cTn id="19" presetID="42" presetClass="entr" presetSubtype="0" fill="hold" grpId="0" nodeType="clickEffect">
+                                  <p:stCondLst>
+                                    <p:cond delay="0"/>
+                                  </p:stCondLst>
+                                  <p:childTnLst>
+                                    <p:set>
+                                      <p:cBhvr>
+                                        <p:cTn id="20" dur="1" fill="hold">
+                                          <p:stCondLst>
+                                            <p:cond delay="0"/>
+                                          </p:stCondLst>
+                                        </p:cTn>
+                                        <p:tgtEl>
+                                          <p:spTgt spid="4">
+                                            <p:graphicEl>
+                                              <a:dgm id="{698152BB-18B9-4B73-AFA7-AE2352CC66E9}"/>
+                                            </p:graphicEl>
+                                          </p:spTgt>
+                                        </p:tgtEl>
+                                        <p:attrNameLst>
+                                          <p:attrName>style.visibility</p:attrName>
+                                        </p:attrNameLst>
+                                      </p:cBhvr>
+                                      <p:to>
+                                        <p:strVal val="visible"/>
+                                      </p:to>
+                                    </p:set>
+                                    <p:animEffect transition="in" filter="fade">
+                                      <p:cBhvr>
+                                        <p:cTn id="21" dur="1000"/>
+                                        <p:tgtEl>
+                                          <p:spTgt spid="4">
+                                            <p:graphicEl>
+                                              <a:dgm id="{698152BB-18B9-4B73-AFA7-AE2352CC66E9}"/>
+                                            </p:graphicEl>
+                                          </p:spTgt>
+                                        </p:tgtEl>
+                                      </p:cBhvr>
+                                    </p:animEffect>
+                                    <p:anim calcmode="lin" valueType="num">
+                                      <p:cBhvr>
+                                        <p:cTn id="22" dur="1000" fill="hold"/>
+                                        <p:tgtEl>
+                                          <p:spTgt spid="4">
+                                            <p:graphicEl>
+                                              <a:dgm id="{698152BB-18B9-4B73-AFA7-AE2352CC66E9}"/>
+                                            </p:graphicEl>
+                                          </p:spTgt>
+                                        </p:tgtEl>
+                                        <p:attrNameLst>
+                                          <p:attrName>ppt_x</p:attrName>
+                                        </p:attrNameLst>
+                                      </p:cBhvr>
+                                      <p:tavLst>
+                                        <p:tav tm="0">
+                                          <p:val>
+                                            <p:strVal val="#ppt_x"/>
+                                          </p:val>
+                                        </p:tav>
+                                        <p:tav tm="100000">
+                                          <p:val>
+                                            <p:strVal val="#ppt_x"/>
+                                          </p:val>
+                                        </p:tav>
+                                      </p:tavLst>
+                                    </p:anim>
+                                    <p:anim calcmode="lin" valueType="num">
+                                      <p:cBhvr>
+                                        <p:cTn id="23" dur="1000" fill="hold"/>
+                                        <p:tgtEl>
+                                          <p:spTgt spid="4">
+                                            <p:graphicEl>
+                                              <a:dgm id="{698152BB-18B9-4B73-AFA7-AE2352CC66E9}"/>
+                                            </p:graphicEl>
+                                          </p:spTgt>
+                                        </p:tgtEl>
+                                        <p:attrNameLst>
+                                          <p:attrName>ppt_y</p:attrName>
+                                        </p:attrNameLst>
+                                      </p:cBhvr>
+                                      <p:tavLst>
+                                        <p:tav tm="0">
+                                          <p:val>
+                                            <p:strVal val="#ppt_y+.1"/>
+                                          </p:val>
+                                        </p:tav>
+                                        <p:tav tm="100000">
+                                          <p:val>
+                                            <p:strVal val="#ppt_y"/>
+                                          </p:val>
+                                        </p:tav>
+                                      </p:tavLst>
+                                    </p:anim>
+                                  </p:childTnLst>
+                                </p:cTn>
+                              </p:par>
+                            </p:childTnLst>
+                          </p:cTn>
+                        </p:par>
+                      </p:childTnLst>
+                    </p:cTn>
+                  </p:par>
+                  <p:par>
+                    <p:cTn id="24" fill="hold">
+                      <p:stCondLst>
+                        <p:cond delay="indefinite"/>
+                      </p:stCondLst>
+                      <p:childTnLst>
+                        <p:par>
+                          <p:cTn id="25" fill="hold">
+                            <p:stCondLst>
+                              <p:cond delay="0"/>
+                            </p:stCondLst>
+                            <p:childTnLst>
+                              <p:par>
+                                <p:cTn id="26" presetID="42" presetClass="entr" presetSubtype="0" fill="hold" grpId="0" nodeType="clickEffect">
+                                  <p:stCondLst>
+                                    <p:cond delay="0"/>
+                                  </p:stCondLst>
+                                  <p:childTnLst>
+                                    <p:set>
+                                      <p:cBhvr>
+                                        <p:cTn id="27" dur="1" fill="hold">
+                                          <p:stCondLst>
+                                            <p:cond delay="0"/>
+                                          </p:stCondLst>
+                                        </p:cTn>
+                                        <p:tgtEl>
+                                          <p:spTgt spid="4">
+                                            <p:graphicEl>
+                                              <a:dgm id="{C6B2301E-6D07-4379-8020-4F7B58A4C07A}"/>
+                                            </p:graphicEl>
+                                          </p:spTgt>
+                                        </p:tgtEl>
+                                        <p:attrNameLst>
+                                          <p:attrName>style.visibility</p:attrName>
+                                        </p:attrNameLst>
+                                      </p:cBhvr>
+                                      <p:to>
+                                        <p:strVal val="visible"/>
+                                      </p:to>
+                                    </p:set>
+                                    <p:animEffect transition="in" filter="fade">
+                                      <p:cBhvr>
+                                        <p:cTn id="28" dur="1000"/>
+                                        <p:tgtEl>
+                                          <p:spTgt spid="4">
+                                            <p:graphicEl>
+                                              <a:dgm id="{C6B2301E-6D07-4379-8020-4F7B58A4C07A}"/>
+                                            </p:graphicEl>
+                                          </p:spTgt>
+                                        </p:tgtEl>
+                                      </p:cBhvr>
+                                    </p:animEffect>
+                                    <p:anim calcmode="lin" valueType="num">
+                                      <p:cBhvr>
+                                        <p:cTn id="29" dur="1000" fill="hold"/>
+                                        <p:tgtEl>
+                                          <p:spTgt spid="4">
+                                            <p:graphicEl>
+                                              <a:dgm id="{C6B2301E-6D07-4379-8020-4F7B58A4C07A}"/>
+                                            </p:graphicEl>
+                                          </p:spTgt>
+                                        </p:tgtEl>
+                                        <p:attrNameLst>
+                                          <p:attrName>ppt_x</p:attrName>
+                                        </p:attrNameLst>
+                                      </p:cBhvr>
+                                      <p:tavLst>
+                                        <p:tav tm="0">
+                                          <p:val>
+                                            <p:strVal val="#ppt_x"/>
+                                          </p:val>
+                                        </p:tav>
+                                        <p:tav tm="100000">
+                                          <p:val>
+                                            <p:strVal val="#ppt_x"/>
+                                          </p:val>
+                                        </p:tav>
+                                      </p:tavLst>
+                                    </p:anim>
+                                    <p:anim calcmode="lin" valueType="num">
+                                      <p:cBhvr>
+                                        <p:cTn id="30" dur="1000" fill="hold"/>
+                                        <p:tgtEl>
+                                          <p:spTgt spid="4">
+                                            <p:graphicEl>
+                                              <a:dgm id="{C6B2301E-6D07-4379-8020-4F7B58A4C07A}"/>
+                                            </p:graphicEl>
+                                          </p:spTgt>
+                                        </p:tgtEl>
+                                        <p:attrNameLst>
+                                          <p:attrName>ppt_y</p:attrName>
+                                        </p:attrNameLst>
+                                      </p:cBhvr>
+                                      <p:tavLst>
+                                        <p:tav tm="0">
+                                          <p:val>
+                                            <p:strVal val="#ppt_y+.1"/>
+                                          </p:val>
+                                        </p:tav>
+                                        <p:tav tm="100000">
+                                          <p:val>
+                                            <p:strVal val="#ppt_y"/>
+                                          </p:val>
+                                        </p:tav>
+                                      </p:tavLst>
+                                    </p:anim>
+                                  </p:childTnLst>
+                                </p:cTn>
+                              </p:par>
+                            </p:childTnLst>
+                          </p:cTn>
+                        </p:par>
+                      </p:childTnLst>
+                    </p:cTn>
+                  </p:par>
+                  <p:par>
+                    <p:cTn id="31" fill="hold">
+                      <p:stCondLst>
+                        <p:cond delay="indefinite"/>
+                      </p:stCondLst>
+                      <p:childTnLst>
+                        <p:par>
+                          <p:cTn id="32" fill="hold">
+                            <p:stCondLst>
+                              <p:cond delay="0"/>
+                            </p:stCondLst>
+                            <p:childTnLst>
+                              <p:par>
+                                <p:cTn id="33" presetID="42" presetClass="entr" presetSubtype="0" fill="hold" grpId="0" nodeType="clickEffect">
+                                  <p:stCondLst>
+                                    <p:cond delay="0"/>
+                                  </p:stCondLst>
+                                  <p:childTnLst>
+                                    <p:set>
+                                      <p:cBhvr>
+                                        <p:cTn id="34" dur="1" fill="hold">
+                                          <p:stCondLst>
+                                            <p:cond delay="0"/>
+                                          </p:stCondLst>
+                                        </p:cTn>
+                                        <p:tgtEl>
+                                          <p:spTgt spid="4">
+                                            <p:graphicEl>
+                                              <a:dgm id="{A5675E25-9C65-4DDD-BBFE-44983E5E3EC7}"/>
+                                            </p:graphicEl>
+                                          </p:spTgt>
+                                        </p:tgtEl>
+                                        <p:attrNameLst>
+                                          <p:attrName>style.visibility</p:attrName>
+                                        </p:attrNameLst>
+                                      </p:cBhvr>
+                                      <p:to>
+                                        <p:strVal val="visible"/>
+                                      </p:to>
+                                    </p:set>
+                                    <p:animEffect transition="in" filter="fade">
+                                      <p:cBhvr>
+                                        <p:cTn id="35" dur="1000"/>
+                                        <p:tgtEl>
+                                          <p:spTgt spid="4">
+                                            <p:graphicEl>
+                                              <a:dgm id="{A5675E25-9C65-4DDD-BBFE-44983E5E3EC7}"/>
+                                            </p:graphicEl>
+                                          </p:spTgt>
+                                        </p:tgtEl>
+                                      </p:cBhvr>
+                                    </p:animEffect>
+                                    <p:anim calcmode="lin" valueType="num">
+                                      <p:cBhvr>
+                                        <p:cTn id="36" dur="1000" fill="hold"/>
+                                        <p:tgtEl>
+                                          <p:spTgt spid="4">
+                                            <p:graphicEl>
+                                              <a:dgm id="{A5675E25-9C65-4DDD-BBFE-44983E5E3EC7}"/>
+                                            </p:graphicEl>
+                                          </p:spTgt>
+                                        </p:tgtEl>
+                                        <p:attrNameLst>
+                                          <p:attrName>ppt_x</p:attrName>
+                                        </p:attrNameLst>
+                                      </p:cBhvr>
+                                      <p:tavLst>
+                                        <p:tav tm="0">
+                                          <p:val>
+                                            <p:strVal val="#ppt_x"/>
+                                          </p:val>
+                                        </p:tav>
+                                        <p:tav tm="100000">
+                                          <p:val>
+                                            <p:strVal val="#ppt_x"/>
+                                          </p:val>
+                                        </p:tav>
+                                      </p:tavLst>
+                                    </p:anim>
+                                    <p:anim calcmode="lin" valueType="num">
+                                      <p:cBhvr>
+                                        <p:cTn id="37" dur="1000" fill="hold"/>
+                                        <p:tgtEl>
+                                          <p:spTgt spid="4">
+                                            <p:graphicEl>
+                                              <a:dgm id="{A5675E25-9C65-4DDD-BBFE-44983E5E3EC7}"/>
+                                            </p:graphicEl>
+                                          </p:spTgt>
+                                        </p:tgtEl>
+                                        <p:attrNameLst>
+                                          <p:attrName>ppt_y</p:attrName>
+                                        </p:attrNameLst>
+                                      </p:cBhvr>
+                                      <p:tavLst>
+                                        <p:tav tm="0">
+                                          <p:val>
+                                            <p:strVal val="#ppt_y+.1"/>
+                                          </p:val>
+                                        </p:tav>
+                                        <p:tav tm="100000">
+                                          <p:val>
+                                            <p:strVal val="#ppt_y"/>
+                                          </p:val>
+                                        </p:tav>
+                                      </p:tavLst>
+                                    </p:anim>
+                                  </p:childTnLst>
+                                </p:cTn>
+                              </p:par>
+                            </p:childTnLst>
+                          </p:cTn>
+                        </p:par>
+                      </p:childTnLst>
+                    </p:cTn>
+                  </p:par>
+                  <p:par>
+                    <p:cTn id="38" fill="hold">
+                      <p:stCondLst>
+                        <p:cond delay="indefinite"/>
+                      </p:stCondLst>
+                      <p:childTnLst>
+                        <p:par>
+                          <p:cTn id="39" fill="hold">
+                            <p:stCondLst>
+                              <p:cond delay="0"/>
+                            </p:stCondLst>
+                            <p:childTnLst>
+                              <p:par>
+                                <p:cTn id="40" presetID="42" presetClass="entr" presetSubtype="0" fill="hold" grpId="0" nodeType="clickEffect">
+                                  <p:stCondLst>
+                                    <p:cond delay="0"/>
+                                  </p:stCondLst>
+                                  <p:childTnLst>
+                                    <p:set>
+                                      <p:cBhvr>
+                                        <p:cTn id="41" dur="1" fill="hold">
+                                          <p:stCondLst>
+                                            <p:cond delay="0"/>
+                                          </p:stCondLst>
+                                        </p:cTn>
+                                        <p:tgtEl>
+                                          <p:spTgt spid="4">
+                                            <p:graphicEl>
+                                              <a:dgm id="{51804ECA-ACC2-4095-B790-EEAE36591A45}"/>
+                                            </p:graphicEl>
+                                          </p:spTgt>
+                                        </p:tgtEl>
+                                        <p:attrNameLst>
+                                          <p:attrName>style.visibility</p:attrName>
+                                        </p:attrNameLst>
+                                      </p:cBhvr>
+                                      <p:to>
+                                        <p:strVal val="visible"/>
+                                      </p:to>
+                                    </p:set>
+                                    <p:animEffect transition="in" filter="fade">
+                                      <p:cBhvr>
+                                        <p:cTn id="42" dur="1000"/>
+                                        <p:tgtEl>
+                                          <p:spTgt spid="4">
+                                            <p:graphicEl>
+                                              <a:dgm id="{51804ECA-ACC2-4095-B790-EEAE36591A45}"/>
+                                            </p:graphicEl>
+                                          </p:spTgt>
+                                        </p:tgtEl>
+                                      </p:cBhvr>
+                                    </p:animEffect>
+                                    <p:anim calcmode="lin" valueType="num">
+                                      <p:cBhvr>
+                                        <p:cTn id="43" dur="1000" fill="hold"/>
+                                        <p:tgtEl>
+                                          <p:spTgt spid="4">
+                                            <p:graphicEl>
+                                              <a:dgm id="{51804ECA-ACC2-4095-B790-EEAE36591A45}"/>
+                                            </p:graphicEl>
+                                          </p:spTgt>
+                                        </p:tgtEl>
+                                        <p:attrNameLst>
+                                          <p:attrName>ppt_x</p:attrName>
+                                        </p:attrNameLst>
+                                      </p:cBhvr>
+                                      <p:tavLst>
+                                        <p:tav tm="0">
+                                          <p:val>
+                                            <p:strVal val="#ppt_x"/>
+                                          </p:val>
+                                        </p:tav>
+                                        <p:tav tm="100000">
+                                          <p:val>
+                                            <p:strVal val="#ppt_x"/>
+                                          </p:val>
+                                        </p:tav>
+                                      </p:tavLst>
+                                    </p:anim>
+                                    <p:anim calcmode="lin" valueType="num">
+                                      <p:cBhvr>
+                                        <p:cTn id="44" dur="1000" fill="hold"/>
+                                        <p:tgtEl>
+                                          <p:spTgt spid="4">
+                                            <p:graphicEl>
+                                              <a:dgm id="{51804ECA-ACC2-4095-B790-EEAE36591A45}"/>
+                                            </p:graphicEl>
+                                          </p:spTgt>
+                                        </p:tgtEl>
+                                        <p:attrNameLst>
+                                          <p:attrName>ppt_y</p:attrName>
+                                        </p:attrNameLst>
+                                      </p:cBhvr>
+                                      <p:tavLst>
+                                        <p:tav tm="0">
+                                          <p:val>
+                                            <p:strVal val="#ppt_y+.1"/>
+                                          </p:val>
+                                        </p:tav>
+                                        <p:tav tm="100000">
+                                          <p:val>
+                                            <p:strVal val="#ppt_y"/>
+                                          </p:val>
+                                        </p:tav>
+                                      </p:tavLst>
+                                    </p:anim>
+                                  </p:childTnLst>
+                                </p:cTn>
+                              </p:par>
+                            </p:childTnLst>
+                          </p:cTn>
+                        </p:par>
+                      </p:childTnLst>
+                    </p:cTn>
+                  </p:par>
+                  <p:par>
+                    <p:cTn id="45" fill="hold">
+                      <p:stCondLst>
+                        <p:cond delay="indefinite"/>
+                      </p:stCondLst>
+                      <p:childTnLst>
+                        <p:par>
+                          <p:cTn id="46" fill="hold">
+                            <p:stCondLst>
+                              <p:cond delay="0"/>
+                            </p:stCondLst>
+                            <p:childTnLst>
+                              <p:par>
+                                <p:cTn id="47" presetID="42" presetClass="entr" presetSubtype="0" fill="hold" grpId="0" nodeType="clickEffect">
+                                  <p:stCondLst>
+                                    <p:cond delay="0"/>
+                                  </p:stCondLst>
+                                  <p:childTnLst>
+                                    <p:set>
+                                      <p:cBhvr>
+                                        <p:cTn id="48" dur="1" fill="hold">
+                                          <p:stCondLst>
+                                            <p:cond delay="0"/>
+                                          </p:stCondLst>
+                                        </p:cTn>
+                                        <p:tgtEl>
+                                          <p:spTgt spid="4">
+                                            <p:graphicEl>
+                                              <a:dgm id="{CE620F5E-049F-46C8-97AA-AF803BD145E5}"/>
+                                            </p:graphicEl>
+                                          </p:spTgt>
+                                        </p:tgtEl>
+                                        <p:attrNameLst>
+                                          <p:attrName>style.visibility</p:attrName>
+                                        </p:attrNameLst>
+                                      </p:cBhvr>
+                                      <p:to>
+                                        <p:strVal val="visible"/>
+                                      </p:to>
+                                    </p:set>
+                                    <p:animEffect transition="in" filter="fade">
+                                      <p:cBhvr>
+                                        <p:cTn id="49" dur="1000"/>
+                                        <p:tgtEl>
+                                          <p:spTgt spid="4">
+                                            <p:graphicEl>
+                                              <a:dgm id="{CE620F5E-049F-46C8-97AA-AF803BD145E5}"/>
+                                            </p:graphicEl>
+                                          </p:spTgt>
+                                        </p:tgtEl>
+                                      </p:cBhvr>
+                                    </p:animEffect>
+                                    <p:anim calcmode="lin" valueType="num">
+                                      <p:cBhvr>
+                                        <p:cTn id="50" dur="1000" fill="hold"/>
+                                        <p:tgtEl>
+                                          <p:spTgt spid="4">
+                                            <p:graphicEl>
+                                              <a:dgm id="{CE620F5E-049F-46C8-97AA-AF803BD145E5}"/>
+                                            </p:graphicEl>
+                                          </p:spTgt>
+                                        </p:tgtEl>
+                                        <p:attrNameLst>
+                                          <p:attrName>ppt_x</p:attrName>
+                                        </p:attrNameLst>
+                                      </p:cBhvr>
+                                      <p:tavLst>
+                                        <p:tav tm="0">
+                                          <p:val>
+                                            <p:strVal val="#ppt_x"/>
+                                          </p:val>
+                                        </p:tav>
+                                        <p:tav tm="100000">
+                                          <p:val>
+                                            <p:strVal val="#ppt_x"/>
+                                          </p:val>
+                                        </p:tav>
+                                      </p:tavLst>
+                                    </p:anim>
+                                    <p:anim calcmode="lin" valueType="num">
+                                      <p:cBhvr>
+                                        <p:cTn id="51" dur="1000" fill="hold"/>
+                                        <p:tgtEl>
+                                          <p:spTgt spid="4">
+                                            <p:graphicEl>
+                                              <a:dgm id="{CE620F5E-049F-46C8-97AA-AF803BD145E5}"/>
+                                            </p:graphicEl>
+                                          </p:spTgt>
+                                        </p:tgtEl>
+                                        <p:attrNameLst>
+                                          <p:attrName>ppt_y</p:attrName>
+                                        </p:attrNameLst>
+                                      </p:cBhvr>
+                                      <p:tavLst>
+                                        <p:tav tm="0">
+                                          <p:val>
+                                            <p:strVal val="#ppt_y+.1"/>
+                                          </p:val>
+                                        </p:tav>
+                                        <p:tav tm="100000">
+                                          <p:val>
+                                            <p:strVal val="#ppt_y"/>
+                                          </p:val>
+                                        </p:tav>
+                                      </p:tavLst>
+                                    </p:anim>
+                                  </p:childTnLst>
+                                </p:cTn>
+                              </p:par>
+                            </p:childTnLst>
+                          </p:cTn>
+                        </p:par>
+                      </p:childTnLst>
+                    </p:cTn>
+                  </p:par>
+                  <p:par>
+                    <p:cTn id="52" fill="hold">
+                      <p:stCondLst>
+                        <p:cond delay="indefinite"/>
+                      </p:stCondLst>
+                      <p:childTnLst>
+                        <p:par>
+                          <p:cTn id="53" fill="hold">
+                            <p:stCondLst>
+                              <p:cond delay="0"/>
+                            </p:stCondLst>
+                            <p:childTnLst>
+                              <p:par>
+                                <p:cTn id="54" presetID="42" presetClass="entr" presetSubtype="0" fill="hold" grpId="0" nodeType="clickEffect">
+                                  <p:stCondLst>
+                                    <p:cond delay="0"/>
+                                  </p:stCondLst>
+                                  <p:childTnLst>
+                                    <p:set>
+                                      <p:cBhvr>
+                                        <p:cTn id="55" dur="1" fill="hold">
+                                          <p:stCondLst>
+                                            <p:cond delay="0"/>
+                                          </p:stCondLst>
+                                        </p:cTn>
+                                        <p:tgtEl>
+                                          <p:spTgt spid="4">
+                                            <p:graphicEl>
+                                              <a:dgm id="{8612C22A-6962-45E2-8C79-7510BE0D4DFB}"/>
+                                            </p:graphicEl>
+                                          </p:spTgt>
+                                        </p:tgtEl>
+                                        <p:attrNameLst>
+                                          <p:attrName>style.visibility</p:attrName>
+                                        </p:attrNameLst>
+                                      </p:cBhvr>
+                                      <p:to>
+                                        <p:strVal val="visible"/>
+                                      </p:to>
+                                    </p:set>
+                                    <p:animEffect transition="in" filter="fade">
+                                      <p:cBhvr>
+                                        <p:cTn id="56" dur="1000"/>
+                                        <p:tgtEl>
+                                          <p:spTgt spid="4">
+                                            <p:graphicEl>
+                                              <a:dgm id="{8612C22A-6962-45E2-8C79-7510BE0D4DFB}"/>
+                                            </p:graphicEl>
+                                          </p:spTgt>
+                                        </p:tgtEl>
+                                      </p:cBhvr>
+                                    </p:animEffect>
+                                    <p:anim calcmode="lin" valueType="num">
+                                      <p:cBhvr>
+                                        <p:cTn id="57" dur="1000" fill="hold"/>
+                                        <p:tgtEl>
+                                          <p:spTgt spid="4">
+                                            <p:graphicEl>
+                                              <a:dgm id="{8612C22A-6962-45E2-8C79-7510BE0D4DFB}"/>
+                                            </p:graphicEl>
+                                          </p:spTgt>
+                                        </p:tgtEl>
+                                        <p:attrNameLst>
+                                          <p:attrName>ppt_x</p:attrName>
+                                        </p:attrNameLst>
+                                      </p:cBhvr>
+                                      <p:tavLst>
+                                        <p:tav tm="0">
+                                          <p:val>
+                                            <p:strVal val="#ppt_x"/>
+                                          </p:val>
+                                        </p:tav>
+                                        <p:tav tm="100000">
+                                          <p:val>
+                                            <p:strVal val="#ppt_x"/>
+                                          </p:val>
+                                        </p:tav>
+                                      </p:tavLst>
+                                    </p:anim>
+                                    <p:anim calcmode="lin" valueType="num">
+                                      <p:cBhvr>
+                                        <p:cTn id="58" dur="1000" fill="hold"/>
+                                        <p:tgtEl>
+                                          <p:spTgt spid="4">
+                                            <p:graphicEl>
+                                              <a:dgm id="{8612C22A-6962-45E2-8C79-7510BE0D4DFB}"/>
+                                            </p:graphicEl>
+                                          </p:spTgt>
+                                        </p:tgtEl>
+                                        <p:attrNameLst>
+                                          <p:attrName>ppt_y</p:attrName>
+                                        </p:attrNameLst>
+                                      </p:cBhvr>
+                                      <p:tavLst>
+                                        <p:tav tm="0">
+                                          <p:val>
+                                            <p:strVal val="#ppt_y+.1"/>
+                                          </p:val>
+                                        </p:tav>
+                                        <p:tav tm="100000">
+                                          <p:val>
+                                            <p:strVal val="#ppt_y"/>
+                                          </p:val>
+                                        </p:tav>
+                                      </p:tavLst>
+                                    </p:anim>
+                                  </p:childTnLst>
+                                </p:cTn>
+                              </p:par>
+                            </p:childTnLst>
+                          </p:cTn>
+                        </p:par>
+                      </p:childTnLst>
+                    </p:cTn>
+                  </p:par>
+                  <p:par>
+                    <p:cTn id="59" fill="hold">
+                      <p:stCondLst>
+                        <p:cond delay="indefinite"/>
+                      </p:stCondLst>
+                      <p:childTnLst>
+                        <p:par>
+                          <p:cTn id="60" fill="hold">
+                            <p:stCondLst>
+                              <p:cond delay="0"/>
+                            </p:stCondLst>
+                            <p:childTnLst>
+                              <p:par>
+                                <p:cTn id="61" presetID="42" presetClass="entr" presetSubtype="0" fill="hold" grpId="0" nodeType="clickEffect">
+                                  <p:stCondLst>
+                                    <p:cond delay="0"/>
+                                  </p:stCondLst>
+                                  <p:childTnLst>
+                                    <p:set>
+                                      <p:cBhvr>
+                                        <p:cTn id="62" dur="1" fill="hold">
+                                          <p:stCondLst>
+                                            <p:cond delay="0"/>
+                                          </p:stCondLst>
+                                        </p:cTn>
+                                        <p:tgtEl>
+                                          <p:spTgt spid="4">
+                                            <p:graphicEl>
+                                              <a:dgm id="{17207947-1894-4E7B-BA79-B97A867C4E95}"/>
+                                            </p:graphicEl>
+                                          </p:spTgt>
+                                        </p:tgtEl>
+                                        <p:attrNameLst>
+                                          <p:attrName>style.visibility</p:attrName>
+                                        </p:attrNameLst>
+                                      </p:cBhvr>
+                                      <p:to>
+                                        <p:strVal val="visible"/>
+                                      </p:to>
+                                    </p:set>
+                                    <p:animEffect transition="in" filter="fade">
+                                      <p:cBhvr>
+                                        <p:cTn id="63" dur="1000"/>
+                                        <p:tgtEl>
+                                          <p:spTgt spid="4">
+                                            <p:graphicEl>
+                                              <a:dgm id="{17207947-1894-4E7B-BA79-B97A867C4E95}"/>
+                                            </p:graphicEl>
+                                          </p:spTgt>
+                                        </p:tgtEl>
+                                      </p:cBhvr>
+                                    </p:animEffect>
+                                    <p:anim calcmode="lin" valueType="num">
+                                      <p:cBhvr>
+                                        <p:cTn id="64" dur="1000" fill="hold"/>
+                                        <p:tgtEl>
+                                          <p:spTgt spid="4">
+                                            <p:graphicEl>
+                                              <a:dgm id="{17207947-1894-4E7B-BA79-B97A867C4E95}"/>
+                                            </p:graphicEl>
+                                          </p:spTgt>
+                                        </p:tgtEl>
+                                        <p:attrNameLst>
+                                          <p:attrName>ppt_x</p:attrName>
+                                        </p:attrNameLst>
+                                      </p:cBhvr>
+                                      <p:tavLst>
+                                        <p:tav tm="0">
+                                          <p:val>
+                                            <p:strVal val="#ppt_x"/>
+                                          </p:val>
+                                        </p:tav>
+                                        <p:tav tm="100000">
+                                          <p:val>
+                                            <p:strVal val="#ppt_x"/>
+                                          </p:val>
+                                        </p:tav>
+                                      </p:tavLst>
+                                    </p:anim>
+                                    <p:anim calcmode="lin" valueType="num">
+                                      <p:cBhvr>
+                                        <p:cTn id="65" dur="1000" fill="hold"/>
+                                        <p:tgtEl>
+                                          <p:spTgt spid="4">
+                                            <p:graphicEl>
+                                              <a:dgm id="{17207947-1894-4E7B-BA79-B97A867C4E95}"/>
+                                            </p:graphicEl>
+                                          </p:spTgt>
+                                        </p:tgtEl>
+                                        <p:attrNameLst>
+                                          <p:attrName>ppt_y</p:attrName>
+                                        </p:attrNameLst>
+                                      </p:cBhvr>
+                                      <p:tavLst>
+                                        <p:tav tm="0">
+                                          <p:val>
+                                            <p:strVal val="#ppt_y+.1"/>
+                                          </p:val>
+                                        </p:tav>
+                                        <p:tav tm="100000">
+                                          <p:val>
+                                            <p:strVal val="#ppt_y"/>
+                                          </p:val>
+                                        </p:tav>
+                                      </p:tavLst>
+                                    </p:anim>
+                                  </p:childTnLst>
+                                </p:cTn>
+                              </p:par>
+                            </p:childTnLst>
+                          </p:cTn>
+                        </p:par>
+                      </p:childTnLst>
+                    </p:cTn>
+                  </p:par>
+                </p:childTnLst>
+              </p:cTn>
+              <p:prevCondLst>
+                <p:cond evt="onPrev" delay="0">
+                  <p:tgtEl>
+                    <p:sldTgt/>
+                  </p:tgtEl>
+                </p:cond>
+              </p:prevCondLst>
+              <p:nextCondLst>
+                <p:cond evt="onNext" delay="0">
+                  <p:tgtEl>
+                    <p:sldTgt/>
+                  </p:tgtEl>
+                </p:cond>
+              </p:nextCondLst>
+            </p:seq>
+          </p:childTnLst>
+        </p:cTn>
+      </p:par>
+    </p:tnLst>
+    <p:bldLst>
+      <p:bldGraphic spid="4" grpId="0">
+        <p:bldSub>
+          <a:bldDgm bld="one"/>
+        </p:bldSub>
+      </p:bldGraphic>
+    </p:bldLst>
+  </p:timing>
 </p:sld>
 </file>
 

</xml_diff>